<commit_message>
Shortening the talk and adding the SQL stuff
</commit_message>
<xml_diff>
--- a/WickedDomainModels/Crafting Wicked Domain Models.pptx
+++ b/WickedDomainModels/Crafting Wicked Domain Models.pptx
@@ -5,29 +5,28 @@
     <p:sldMasterId id="2147483696" r:id="rId1"/>
   </p:sldMasterIdLst>
   <p:notesMasterIdLst>
-    <p:notesMasterId r:id="rId22"/>
+    <p:notesMasterId r:id="rId21"/>
   </p:notesMasterIdLst>
   <p:sldIdLst>
     <p:sldId id="284" r:id="rId2"/>
     <p:sldId id="260" r:id="rId3"/>
     <p:sldId id="262" r:id="rId4"/>
-    <p:sldId id="263" r:id="rId5"/>
-    <p:sldId id="275" r:id="rId6"/>
-    <p:sldId id="270" r:id="rId7"/>
-    <p:sldId id="271" r:id="rId8"/>
-    <p:sldId id="272" r:id="rId9"/>
-    <p:sldId id="273" r:id="rId10"/>
-    <p:sldId id="264" r:id="rId11"/>
-    <p:sldId id="266" r:id="rId12"/>
-    <p:sldId id="267" r:id="rId13"/>
-    <p:sldId id="274" r:id="rId14"/>
-    <p:sldId id="269" r:id="rId15"/>
-    <p:sldId id="276" r:id="rId16"/>
-    <p:sldId id="277" r:id="rId17"/>
-    <p:sldId id="278" r:id="rId18"/>
-    <p:sldId id="279" r:id="rId19"/>
-    <p:sldId id="280" r:id="rId20"/>
-    <p:sldId id="283" r:id="rId21"/>
+    <p:sldId id="275" r:id="rId5"/>
+    <p:sldId id="270" r:id="rId6"/>
+    <p:sldId id="271" r:id="rId7"/>
+    <p:sldId id="272" r:id="rId8"/>
+    <p:sldId id="273" r:id="rId9"/>
+    <p:sldId id="264" r:id="rId10"/>
+    <p:sldId id="266" r:id="rId11"/>
+    <p:sldId id="267" r:id="rId12"/>
+    <p:sldId id="274" r:id="rId13"/>
+    <p:sldId id="269" r:id="rId14"/>
+    <p:sldId id="276" r:id="rId15"/>
+    <p:sldId id="277" r:id="rId16"/>
+    <p:sldId id="278" r:id="rId17"/>
+    <p:sldId id="279" r:id="rId18"/>
+    <p:sldId id="280" r:id="rId19"/>
+    <p:sldId id="283" r:id="rId20"/>
   </p:sldIdLst>
   <p:sldSz cx="9144000" cy="6858000" type="screen4x3"/>
   <p:notesSz cx="6858000" cy="9144000"/>
@@ -733,6 +732,42 @@
           <a:bodyPr/>
           <a:lstStyle/>
           <a:p>
+            <a:r>
+              <a:rPr lang="en-US" sz="1200" b="0" i="0" kern="1200" dirty="0" smtClean="0">
+                <a:solidFill>
+                  <a:schemeClr val="tx1"/>
+                </a:solidFill>
+                <a:effectLst/>
+                <a:latin typeface="+mn-lt"/>
+                <a:ea typeface="+mn-ea"/>
+                <a:cs typeface="+mn-cs"/>
+              </a:rPr>
+              <a:t>The basic symptom of an Anemic Domain Model is that at first blush it looks like the real thing. There are objects, many named after the nouns in the domain space, and these objects are connected with the rich relationships and structure that true domain models have. The catch comes when you look at the behavior, and you realize that there is hardly any behavior on these objects, making them little more than bags of getters and setters. Indeed often these models come with design rules that say that you are not to put any domain logic in the </a:t>
+            </a:r>
+            <a:r>
+              <a:rPr lang="en-US" sz="1200" b="0" i="0" kern="1200" dirty="0" err="1" smtClean="0">
+                <a:solidFill>
+                  <a:schemeClr val="tx1"/>
+                </a:solidFill>
+                <a:effectLst/>
+                <a:latin typeface="+mn-lt"/>
+                <a:ea typeface="+mn-ea"/>
+                <a:cs typeface="+mn-cs"/>
+              </a:rPr>
+              <a:t>the</a:t>
+            </a:r>
+            <a:r>
+              <a:rPr lang="en-US" sz="1200" b="0" i="0" kern="1200" dirty="0" smtClean="0">
+                <a:solidFill>
+                  <a:schemeClr val="tx1"/>
+                </a:solidFill>
+                <a:effectLst/>
+                <a:latin typeface="+mn-lt"/>
+                <a:ea typeface="+mn-ea"/>
+                <a:cs typeface="+mn-cs"/>
+              </a:rPr>
+              <a:t> domain objects. Instead there are a set of service objects which capture all the domain logic. These services live on top of the domain model and use the domain model for data.</a:t>
+            </a:r>
             <a:endParaRPr lang="en-US" dirty="0"/>
           </a:p>
         </p:txBody>
@@ -817,42 +852,6 @@
           <a:bodyPr/>
           <a:lstStyle/>
           <a:p>
-            <a:r>
-              <a:rPr lang="en-US" sz="1200" b="0" i="0" kern="1200" dirty="0" smtClean="0">
-                <a:solidFill>
-                  <a:schemeClr val="tx1"/>
-                </a:solidFill>
-                <a:effectLst/>
-                <a:latin typeface="+mn-lt"/>
-                <a:ea typeface="+mn-ea"/>
-                <a:cs typeface="+mn-cs"/>
-              </a:rPr>
-              <a:t>The basic symptom of an Anemic Domain Model is that at first blush it looks like the real thing. There are objects, many named after the nouns in the domain space, and these objects are connected with the rich relationships and structure that true domain models have. The catch comes when you look at the behavior, and you realize that there is hardly any behavior on these objects, making them little more than bags of getters and setters. Indeed often these models come with design rules that say that you are not to put any domain logic in the </a:t>
-            </a:r>
-            <a:r>
-              <a:rPr lang="en-US" sz="1200" b="0" i="0" kern="1200" dirty="0" err="1" smtClean="0">
-                <a:solidFill>
-                  <a:schemeClr val="tx1"/>
-                </a:solidFill>
-                <a:effectLst/>
-                <a:latin typeface="+mn-lt"/>
-                <a:ea typeface="+mn-ea"/>
-                <a:cs typeface="+mn-cs"/>
-              </a:rPr>
-              <a:t>the</a:t>
-            </a:r>
-            <a:r>
-              <a:rPr lang="en-US" sz="1200" b="0" i="0" kern="1200" dirty="0" smtClean="0">
-                <a:solidFill>
-                  <a:schemeClr val="tx1"/>
-                </a:solidFill>
-                <a:effectLst/>
-                <a:latin typeface="+mn-lt"/>
-                <a:ea typeface="+mn-ea"/>
-                <a:cs typeface="+mn-cs"/>
-              </a:rPr>
-              <a:t> domain objects. Instead there are a set of service objects which capture all the domain logic. These services live on top of the domain model and use the domain model for data.</a:t>
-            </a:r>
             <a:endParaRPr lang="en-US" dirty="0"/>
           </a:p>
         </p:txBody>
@@ -937,6 +936,14 @@
           <a:bodyPr/>
           <a:lstStyle/>
           <a:p>
+            <a:r>
+              <a:rPr lang="en-US" dirty="0" smtClean="0"/>
+              <a:t>Paying</a:t>
+            </a:r>
+            <a:r>
+              <a:rPr lang="en-US" baseline="0" dirty="0" smtClean="0"/>
+              <a:t> attention to code smells, model smells, OO and refactoring</a:t>
+            </a:r>
             <a:endParaRPr lang="en-US" dirty="0"/>
           </a:p>
         </p:txBody>
@@ -958,99 +965,7 @@
           <a:p>
             <a:fld id="{CCC3FF49-3932-43E0-8B20-094659508D18}" type="slidenum">
               <a:rPr lang="en-US" smtClean="0"/>
-              <a:t>14</a:t>
-            </a:fld>
-            <a:endParaRPr lang="en-US"/>
-          </a:p>
-        </p:txBody>
-      </p:sp>
-    </p:spTree>
-    <p:extLst>
-      <p:ext uri="{BB962C8B-B14F-4D97-AF65-F5344CB8AC3E}">
-        <p14:creationId xmlns:p14="http://schemas.microsoft.com/office/powerpoint/2010/main" val="1209981210"/>
-      </p:ext>
-    </p:extLst>
-  </p:cSld>
-  <p:clrMapOvr>
-    <a:masterClrMapping/>
-  </p:clrMapOvr>
-</p:notes>
-</file>
-
-<file path=ppt/notesSlides/notesSlide14.xml><?xml version="1.0" encoding="utf-8"?>
-<p:notes xmlns:a="http://schemas.openxmlformats.org/drawingml/2006/main" xmlns:r="http://schemas.openxmlformats.org/officeDocument/2006/relationships" xmlns:p="http://schemas.openxmlformats.org/presentationml/2006/main">
-  <p:cSld>
-    <p:spTree>
-      <p:nvGrpSpPr>
-        <p:cNvPr id="1" name=""/>
-        <p:cNvGrpSpPr/>
-        <p:nvPr/>
-      </p:nvGrpSpPr>
-      <p:grpSpPr>
-        <a:xfrm>
-          <a:off x="0" y="0"/>
-          <a:ext cx="0" cy="0"/>
-          <a:chOff x="0" y="0"/>
-          <a:chExt cx="0" cy="0"/>
-        </a:xfrm>
-      </p:grpSpPr>
-      <p:sp>
-        <p:nvSpPr>
-          <p:cNvPr id="2" name="Slide Image Placeholder 1"/>
-          <p:cNvSpPr>
-            <a:spLocks noGrp="1" noRot="1" noChangeAspect="1"/>
-          </p:cNvSpPr>
-          <p:nvPr>
-            <p:ph type="sldImg"/>
-          </p:nvPr>
-        </p:nvSpPr>
-        <p:spPr/>
-      </p:sp>
-      <p:sp>
-        <p:nvSpPr>
-          <p:cNvPr id="3" name="Notes Placeholder 2"/>
-          <p:cNvSpPr>
-            <a:spLocks noGrp="1"/>
-          </p:cNvSpPr>
-          <p:nvPr>
-            <p:ph type="body" idx="1"/>
-          </p:nvPr>
-        </p:nvSpPr>
-        <p:spPr/>
-        <p:txBody>
-          <a:bodyPr/>
-          <a:lstStyle/>
-          <a:p>
-            <a:r>
-              <a:rPr lang="en-US" dirty="0" smtClean="0"/>
-              <a:t>Paying</a:t>
-            </a:r>
-            <a:r>
-              <a:rPr lang="en-US" baseline="0" dirty="0" smtClean="0"/>
-              <a:t> attention to code smells, model smells, OO and refactoring</a:t>
-            </a:r>
-            <a:endParaRPr lang="en-US" dirty="0"/>
-          </a:p>
-        </p:txBody>
-      </p:sp>
-      <p:sp>
-        <p:nvSpPr>
-          <p:cNvPr id="4" name="Slide Number Placeholder 3"/>
-          <p:cNvSpPr>
-            <a:spLocks noGrp="1"/>
-          </p:cNvSpPr>
-          <p:nvPr>
-            <p:ph type="sldNum" sz="quarter" idx="10"/>
-          </p:nvPr>
-        </p:nvSpPr>
-        <p:spPr/>
-        <p:txBody>
-          <a:bodyPr/>
-          <a:lstStyle/>
-          <a:p>
-            <a:fld id="{CCC3FF49-3932-43E0-8B20-094659508D18}" type="slidenum">
-              <a:rPr lang="en-US" smtClean="0"/>
-              <a:t>20</a:t>
+              <a:t>19</a:t>
             </a:fld>
             <a:endParaRPr lang="en-US"/>
           </a:p>
@@ -1128,8 +1043,22 @@
           <a:p>
             <a:r>
               <a:rPr lang="en-US" baseline="0" dirty="0" smtClean="0"/>
-              <a:t>When you should – complex domain, or a long-lived project where behavior gets added piece by piece</a:t>
-            </a:r>
+              <a:t>When you should – complex domain, or a long-lived project where behavior gets added piece by </a:t>
+            </a:r>
+            <a:r>
+              <a:rPr lang="en-US" baseline="0" dirty="0" smtClean="0"/>
+              <a:t>piece</a:t>
+            </a:r>
+          </a:p>
+          <a:p>
+            <a:endParaRPr lang="en-US" baseline="0" dirty="0" smtClean="0"/>
+          </a:p>
+          <a:p>
+            <a:r>
+              <a:rPr lang="en-US" baseline="0" dirty="0" smtClean="0"/>
+              <a:t>Good news – we can delay this decision until it’s needed</a:t>
+            </a:r>
+            <a:endParaRPr lang="en-US" baseline="0" dirty="0" smtClean="0"/>
           </a:p>
         </p:txBody>
       </p:sp>
@@ -1213,10 +1142,6 @@
           <a:bodyPr/>
           <a:lstStyle/>
           <a:p>
-            <a:r>
-              <a:rPr lang="en-US" dirty="0" smtClean="0"/>
-              <a:t>We can delay the decision and design until it’s needed</a:t>
-            </a:r>
             <a:endParaRPr lang="en-US" dirty="0"/>
           </a:p>
         </p:txBody>
@@ -1301,6 +1226,23 @@
           <a:bodyPr/>
           <a:lstStyle/>
           <a:p>
+            <a:r>
+              <a:rPr lang="en-US" dirty="0" smtClean="0"/>
+              <a:t>Loyalty program</a:t>
+            </a:r>
+          </a:p>
+          <a:p>
+            <a:endParaRPr lang="en-US" dirty="0" smtClean="0"/>
+          </a:p>
+          <a:p>
+            <a:r>
+              <a:rPr lang="en-US" dirty="0" smtClean="0"/>
+              <a:t>Looks rich,</a:t>
+            </a:r>
+            <a:r>
+              <a:rPr lang="en-US" baseline="0" dirty="0" smtClean="0"/>
+              <a:t> right?</a:t>
+            </a:r>
             <a:endParaRPr lang="en-US" dirty="0"/>
           </a:p>
         </p:txBody>
@@ -1789,23 +1731,6 @@
           <a:bodyPr/>
           <a:lstStyle/>
           <a:p>
-            <a:r>
-              <a:rPr lang="en-US" dirty="0" smtClean="0"/>
-              <a:t>Loyalty program</a:t>
-            </a:r>
-          </a:p>
-          <a:p>
-            <a:endParaRPr lang="en-US" dirty="0" smtClean="0"/>
-          </a:p>
-          <a:p>
-            <a:r>
-              <a:rPr lang="en-US" dirty="0" smtClean="0"/>
-              <a:t>Looks rich,</a:t>
-            </a:r>
-            <a:r>
-              <a:rPr lang="en-US" baseline="0" dirty="0" smtClean="0"/>
-              <a:t> right?</a:t>
-            </a:r>
             <a:endParaRPr lang="en-US" dirty="0"/>
           </a:p>
         </p:txBody>
@@ -1867,7 +1792,11 @@
         <p:nvSpPr>
           <p:cNvPr id="13" name="Rectangle 12"/>
           <p:cNvSpPr/>
-          <p:nvPr/>
+          <p:nvPr>
+            <p:custDataLst>
+              <p:tags r:id="rId1"/>
+            </p:custDataLst>
+          </p:nvPr>
         </p:nvSpPr>
         <p:spPr>
           <a:xfrm>
@@ -1913,7 +1842,11 @@
         <p:nvSpPr>
           <p:cNvPr id="9" name="Rectangle 8"/>
           <p:cNvSpPr/>
-          <p:nvPr/>
+          <p:nvPr>
+            <p:custDataLst>
+              <p:tags r:id="rId2"/>
+            </p:custDataLst>
+          </p:nvPr>
         </p:nvSpPr>
         <p:spPr>
           <a:xfrm>
@@ -1963,7 +1896,11 @@
         <p:nvSpPr>
           <p:cNvPr id="8" name="Rectangle 7"/>
           <p:cNvSpPr/>
-          <p:nvPr/>
+          <p:nvPr>
+            <p:custDataLst>
+              <p:tags r:id="rId3"/>
+            </p:custDataLst>
+          </p:nvPr>
         </p:nvSpPr>
         <p:spPr>
           <a:xfrm>
@@ -2015,6 +1952,9 @@
           </p:cNvSpPr>
           <p:nvPr>
             <p:ph type="ctrTitle"/>
+            <p:custDataLst>
+              <p:tags r:id="rId4"/>
+            </p:custDataLst>
           </p:nvPr>
         </p:nvSpPr>
         <p:spPr>
@@ -2057,6 +1997,9 @@
           </p:cNvSpPr>
           <p:nvPr>
             <p:ph type="subTitle" idx="1"/>
+            <p:custDataLst>
+              <p:tags r:id="rId5"/>
+            </p:custDataLst>
           </p:nvPr>
         </p:nvSpPr>
         <p:spPr>
@@ -2180,10 +2123,14 @@
           <p:cNvPicPr>
             <a:picLocks noChangeAspect="1"/>
           </p:cNvPicPr>
-          <p:nvPr/>
+          <p:nvPr>
+            <p:custDataLst>
+              <p:tags r:id="rId6"/>
+            </p:custDataLst>
+          </p:nvPr>
         </p:nvPicPr>
         <p:blipFill>
-          <a:blip r:embed="rId2" cstate="print">
+          <a:blip r:embed="rId10" cstate="print">
             <a:extLst>
               <a:ext uri="{28A0092B-C50C-407E-A947-70E740481C1C}">
                 <a14:useLocalDpi xmlns:a14="http://schemas.microsoft.com/office/drawing/2010/main" val="0"/>
@@ -2208,7 +2155,11 @@
         <p:nvSpPr>
           <p:cNvPr id="17" name="Rectangle 16"/>
           <p:cNvSpPr/>
-          <p:nvPr/>
+          <p:nvPr>
+            <p:custDataLst>
+              <p:tags r:id="rId7"/>
+            </p:custDataLst>
+          </p:nvPr>
         </p:nvSpPr>
         <p:spPr>
           <a:xfrm>
@@ -2256,7 +2207,11 @@
         <p:nvSpPr>
           <p:cNvPr id="18" name="Rectangle 17"/>
           <p:cNvSpPr/>
-          <p:nvPr/>
+          <p:nvPr>
+            <p:custDataLst>
+              <p:tags r:id="rId8"/>
+            </p:custDataLst>
+          </p:nvPr>
         </p:nvSpPr>
         <p:spPr>
           <a:xfrm>
@@ -2340,6 +2295,9 @@
           </p:cNvSpPr>
           <p:nvPr>
             <p:ph type="title"/>
+            <p:custDataLst>
+              <p:tags r:id="rId1"/>
+            </p:custDataLst>
           </p:nvPr>
         </p:nvSpPr>
         <p:spPr/>
@@ -2363,6 +2321,9 @@
           </p:cNvSpPr>
           <p:nvPr>
             <p:ph idx="1"/>
+            <p:custDataLst>
+              <p:tags r:id="rId2"/>
+            </p:custDataLst>
           </p:nvPr>
         </p:nvSpPr>
         <p:spPr>
@@ -2452,6 +2413,9 @@
           </p:cNvSpPr>
           <p:nvPr>
             <p:ph type="title"/>
+            <p:custDataLst>
+              <p:tags r:id="rId1"/>
+            </p:custDataLst>
           </p:nvPr>
         </p:nvSpPr>
         <p:spPr/>
@@ -2475,6 +2439,9 @@
           </p:cNvSpPr>
           <p:nvPr>
             <p:ph sz="half" idx="1"/>
+            <p:custDataLst>
+              <p:tags r:id="rId2"/>
+            </p:custDataLst>
           </p:nvPr>
         </p:nvSpPr>
         <p:spPr>
@@ -2560,6 +2527,9 @@
           </p:cNvSpPr>
           <p:nvPr>
             <p:ph sz="half" idx="2"/>
+            <p:custDataLst>
+              <p:tags r:id="rId3"/>
+            </p:custDataLst>
           </p:nvPr>
         </p:nvSpPr>
         <p:spPr>
@@ -2677,6 +2647,9 @@
           </p:cNvSpPr>
           <p:nvPr>
             <p:ph type="title"/>
+            <p:custDataLst>
+              <p:tags r:id="rId1"/>
+            </p:custDataLst>
           </p:nvPr>
         </p:nvSpPr>
         <p:spPr/>
@@ -2704,6 +2677,9 @@
           </p:cNvSpPr>
           <p:nvPr>
             <p:ph type="body" idx="1"/>
+            <p:custDataLst>
+              <p:tags r:id="rId2"/>
+            </p:custDataLst>
           </p:nvPr>
         </p:nvSpPr>
         <p:spPr>
@@ -2774,6 +2750,9 @@
           </p:cNvSpPr>
           <p:nvPr>
             <p:ph sz="half" idx="2"/>
+            <p:custDataLst>
+              <p:tags r:id="rId3"/>
+            </p:custDataLst>
           </p:nvPr>
         </p:nvSpPr>
         <p:spPr>
@@ -2859,6 +2838,9 @@
           </p:cNvSpPr>
           <p:nvPr>
             <p:ph type="body" sz="quarter" idx="3"/>
+            <p:custDataLst>
+              <p:tags r:id="rId4"/>
+            </p:custDataLst>
           </p:nvPr>
         </p:nvSpPr>
         <p:spPr>
@@ -2904,6 +2886,9 @@
           </p:cNvSpPr>
           <p:nvPr>
             <p:ph sz="quarter" idx="4"/>
+            <p:custDataLst>
+              <p:tags r:id="rId5"/>
+            </p:custDataLst>
           </p:nvPr>
         </p:nvSpPr>
         <p:spPr>
@@ -3021,6 +3006,9 @@
           </p:cNvSpPr>
           <p:nvPr>
             <p:ph type="title"/>
+            <p:custDataLst>
+              <p:tags r:id="rId1"/>
+            </p:custDataLst>
           </p:nvPr>
         </p:nvSpPr>
         <p:spPr>
@@ -3053,6 +3041,9 @@
           </p:cNvSpPr>
           <p:nvPr>
             <p:ph type="body" idx="1"/>
+            <p:custDataLst>
+              <p:tags r:id="rId2"/>
+            </p:custDataLst>
           </p:nvPr>
         </p:nvSpPr>
         <p:spPr>
@@ -3126,7 +3117,7 @@
     <p:bg>
       <p:bgPr>
         <a:blipFill dpi="0" rotWithShape="1">
-          <a:blip r:embed="rId7">
+          <a:blip r:embed="rId10">
             <a:lum/>
           </a:blip>
           <a:srcRect/>
@@ -3159,6 +3150,9 @@
           </p:cNvSpPr>
           <p:nvPr>
             <p:ph type="title"/>
+            <p:custDataLst>
+              <p:tags r:id="rId7"/>
+            </p:custDataLst>
           </p:nvPr>
         </p:nvSpPr>
         <p:spPr>
@@ -3197,6 +3191,9 @@
           </p:cNvSpPr>
           <p:nvPr>
             <p:ph type="body" idx="1"/>
+            <p:custDataLst>
+              <p:tags r:id="rId8"/>
+            </p:custDataLst>
           </p:nvPr>
         </p:nvSpPr>
         <p:spPr>
@@ -3262,10 +3259,14 @@
           <p:cNvPicPr>
             <a:picLocks noChangeAspect="1"/>
           </p:cNvPicPr>
-          <p:nvPr/>
+          <p:nvPr>
+            <p:custDataLst>
+              <p:tags r:id="rId9"/>
+            </p:custDataLst>
+          </p:nvPr>
         </p:nvPicPr>
         <p:blipFill>
-          <a:blip r:embed="rId8" cstate="print">
+          <a:blip r:embed="rId11" cstate="print">
             <a:extLst>
               <a:ext uri="{28A0092B-C50C-407E-A947-70E740481C1C}">
                 <a14:useLocalDpi xmlns:a14="http://schemas.microsoft.com/office/drawing/2010/main" val="0"/>
@@ -3581,6 +3582,9 @@
           </p:cNvSpPr>
           <p:nvPr>
             <p:ph type="ctrTitle"/>
+            <p:custDataLst>
+              <p:tags r:id="rId2"/>
+            </p:custDataLst>
           </p:nvPr>
         </p:nvSpPr>
         <p:spPr/>
@@ -3604,6 +3608,9 @@
           </p:cNvSpPr>
           <p:nvPr>
             <p:ph type="subTitle" idx="1"/>
+            <p:custDataLst>
+              <p:tags r:id="rId3"/>
+            </p:custDataLst>
           </p:nvPr>
         </p:nvSpPr>
         <p:spPr/>
@@ -3644,6 +3651,9 @@
         </p:txBody>
       </p:sp>
     </p:spTree>
+    <p:custDataLst>
+      <p:tags r:id="rId1"/>
+    </p:custDataLst>
     <p:extLst>
       <p:ext uri="{BB962C8B-B14F-4D97-AF65-F5344CB8AC3E}">
         <p14:creationId xmlns:p14="http://schemas.microsoft.com/office/powerpoint/2010/main" val="3209948613"/>
@@ -3653,10 +3663,1740 @@
   <p:clrMapOvr>
     <a:masterClrMapping/>
   </p:clrMapOvr>
+  <p:timing>
+    <p:tnLst>
+      <p:par>
+        <p:cTn id="1" dur="indefinite" restart="never" nodeType="tmRoot"/>
+      </p:par>
+    </p:tnLst>
+  </p:timing>
 </p:sld>
 </file>
 
 <file path=ppt/slides/slide10.xml><?xml version="1.0" encoding="utf-8"?>
+<p:sld xmlns:a="http://schemas.openxmlformats.org/drawingml/2006/main" xmlns:r="http://schemas.openxmlformats.org/officeDocument/2006/relationships" xmlns:p="http://schemas.openxmlformats.org/presentationml/2006/main">
+  <p:cSld>
+    <p:spTree>
+      <p:nvGrpSpPr>
+        <p:cNvPr id="1" name=""/>
+        <p:cNvGrpSpPr/>
+        <p:nvPr/>
+      </p:nvGrpSpPr>
+      <p:grpSpPr>
+        <a:xfrm>
+          <a:off x="0" y="0"/>
+          <a:ext cx="0" cy="0"/>
+          <a:chOff x="0" y="0"/>
+          <a:chExt cx="0" cy="0"/>
+        </a:xfrm>
+      </p:grpSpPr>
+      <p:sp>
+        <p:nvSpPr>
+          <p:cNvPr id="3" name="Text Placeholder 2"/>
+          <p:cNvSpPr>
+            <a:spLocks noGrp="1"/>
+          </p:cNvSpPr>
+          <p:nvPr>
+            <p:ph type="body" idx="1"/>
+            <p:custDataLst>
+              <p:tags r:id="rId2"/>
+            </p:custDataLst>
+          </p:nvPr>
+        </p:nvSpPr>
+        <p:spPr>
+          <a:xfrm>
+            <a:off x="762000" y="2767013"/>
+            <a:ext cx="7772400" cy="1500187"/>
+          </a:xfrm>
+        </p:spPr>
+        <p:txBody>
+          <a:bodyPr>
+            <a:noAutofit/>
+          </a:bodyPr>
+          <a:lstStyle/>
+          <a:p>
+            <a:r>
+              <a:rPr lang="en-US" sz="5400" dirty="0" smtClean="0"/>
+              <a:t>Where’s the behavior?</a:t>
+            </a:r>
+            <a:endParaRPr lang="en-US" sz="5400" dirty="0"/>
+          </a:p>
+        </p:txBody>
+      </p:sp>
+    </p:spTree>
+    <p:custDataLst>
+      <p:tags r:id="rId1"/>
+    </p:custDataLst>
+    <p:extLst>
+      <p:ext uri="{BB962C8B-B14F-4D97-AF65-F5344CB8AC3E}">
+        <p14:creationId xmlns:p14="http://schemas.microsoft.com/office/powerpoint/2010/main" val="21984998"/>
+      </p:ext>
+    </p:extLst>
+  </p:cSld>
+  <p:clrMapOvr>
+    <a:masterClrMapping/>
+  </p:clrMapOvr>
+  <p:timing>
+    <p:tnLst>
+      <p:par>
+        <p:cTn id="1" dur="indefinite" restart="never" nodeType="tmRoot"/>
+      </p:par>
+    </p:tnLst>
+  </p:timing>
+</p:sld>
+</file>
+
+<file path=ppt/slides/slide11.xml><?xml version="1.0" encoding="utf-8"?>
+<p:sld xmlns:a="http://schemas.openxmlformats.org/drawingml/2006/main" xmlns:r="http://schemas.openxmlformats.org/officeDocument/2006/relationships" xmlns:p="http://schemas.openxmlformats.org/presentationml/2006/main">
+  <p:cSld>
+    <p:spTree>
+      <p:nvGrpSpPr>
+        <p:cNvPr id="1" name=""/>
+        <p:cNvGrpSpPr/>
+        <p:nvPr/>
+      </p:nvGrpSpPr>
+      <p:grpSpPr>
+        <a:xfrm>
+          <a:off x="0" y="0"/>
+          <a:ext cx="0" cy="0"/>
+          <a:chOff x="0" y="0"/>
+          <a:chExt cx="0" cy="0"/>
+        </a:xfrm>
+      </p:grpSpPr>
+      <p:pic>
+        <p:nvPicPr>
+          <p:cNvPr id="2050" name="Picture 2"/>
+          <p:cNvPicPr>
+            <a:picLocks noChangeAspect="1" noChangeArrowheads="1"/>
+          </p:cNvPicPr>
+          <p:nvPr>
+            <p:custDataLst>
+              <p:tags r:id="rId2"/>
+            </p:custDataLst>
+          </p:nvPr>
+        </p:nvPicPr>
+        <p:blipFill>
+          <a:blip r:embed="rId5">
+            <a:extLst>
+              <a:ext uri="{28A0092B-C50C-407E-A947-70E740481C1C}">
+                <a14:useLocalDpi xmlns:a14="http://schemas.microsoft.com/office/drawing/2010/main" val="0"/>
+              </a:ext>
+            </a:extLst>
+          </a:blip>
+          <a:srcRect/>
+          <a:stretch>
+            <a:fillRect/>
+          </a:stretch>
+        </p:blipFill>
+        <p:spPr bwMode="auto">
+          <a:xfrm>
+            <a:off x="838200" y="1115290"/>
+            <a:ext cx="7162800" cy="5027735"/>
+          </a:xfrm>
+          <a:prstGeom prst="rect">
+            <a:avLst/>
+          </a:prstGeom>
+          <a:noFill/>
+          <a:ln>
+            <a:noFill/>
+          </a:ln>
+          <a:effectLst/>
+          <a:extLst>
+            <a:ext uri="{909E8E84-426E-40DD-AFC4-6F175D3DCCD1}">
+              <a14:hiddenFill xmlns:a14="http://schemas.microsoft.com/office/drawing/2010/main">
+                <a:solidFill>
+                  <a:schemeClr val="accent1"/>
+                </a:solidFill>
+              </a14:hiddenFill>
+            </a:ext>
+            <a:ext uri="{91240B29-F687-4F45-9708-019B960494DF}">
+              <a14:hiddenLine xmlns:a14="http://schemas.microsoft.com/office/drawing/2010/main" w="9525">
+                <a:solidFill>
+                  <a:schemeClr val="tx1"/>
+                </a:solidFill>
+                <a:miter lim="800000"/>
+                <a:headEnd/>
+                <a:tailEnd/>
+              </a14:hiddenLine>
+            </a:ext>
+            <a:ext uri="{AF507438-7753-43E0-B8FC-AC1667EBCBE1}">
+              <a14:hiddenEffects xmlns:a14="http://schemas.microsoft.com/office/drawing/2010/main">
+                <a:effectLst>
+                  <a:outerShdw dist="35921" dir="2700000" algn="ctr" rotWithShape="0">
+                    <a:schemeClr val="bg2"/>
+                  </a:outerShdw>
+                </a:effectLst>
+              </a14:hiddenEffects>
+            </a:ext>
+          </a:extLst>
+        </p:spPr>
+      </p:pic>
+    </p:spTree>
+    <p:custDataLst>
+      <p:tags r:id="rId1"/>
+    </p:custDataLst>
+    <p:extLst>
+      <p:ext uri="{BB962C8B-B14F-4D97-AF65-F5344CB8AC3E}">
+        <p14:creationId xmlns:p14="http://schemas.microsoft.com/office/powerpoint/2010/main" val="2079946211"/>
+      </p:ext>
+    </p:extLst>
+  </p:cSld>
+  <p:clrMapOvr>
+    <a:masterClrMapping/>
+  </p:clrMapOvr>
+  <p:timing>
+    <p:tnLst>
+      <p:par>
+        <p:cTn id="1" dur="indefinite" restart="never" nodeType="tmRoot"/>
+      </p:par>
+    </p:tnLst>
+  </p:timing>
+</p:sld>
+</file>
+
+<file path=ppt/slides/slide12.xml><?xml version="1.0" encoding="utf-8"?>
+<p:sld xmlns:a="http://schemas.openxmlformats.org/drawingml/2006/main" xmlns:r="http://schemas.openxmlformats.org/officeDocument/2006/relationships" xmlns:p="http://schemas.openxmlformats.org/presentationml/2006/main">
+  <p:cSld>
+    <p:spTree>
+      <p:nvGrpSpPr>
+        <p:cNvPr id="1" name=""/>
+        <p:cNvGrpSpPr/>
+        <p:nvPr/>
+      </p:nvGrpSpPr>
+      <p:grpSpPr>
+        <a:xfrm>
+          <a:off x="0" y="0"/>
+          <a:ext cx="0" cy="0"/>
+          <a:chOff x="0" y="0"/>
+          <a:chExt cx="0" cy="0"/>
+        </a:xfrm>
+      </p:grpSpPr>
+      <p:sp>
+        <p:nvSpPr>
+          <p:cNvPr id="3" name="Text Placeholder 2"/>
+          <p:cNvSpPr>
+            <a:spLocks noGrp="1"/>
+          </p:cNvSpPr>
+          <p:nvPr>
+            <p:ph type="body" idx="1"/>
+            <p:custDataLst>
+              <p:tags r:id="rId2"/>
+            </p:custDataLst>
+          </p:nvPr>
+        </p:nvSpPr>
+        <p:spPr>
+          <a:xfrm>
+            <a:off x="762000" y="2767013"/>
+            <a:ext cx="7772400" cy="1500187"/>
+          </a:xfrm>
+        </p:spPr>
+        <p:txBody>
+          <a:bodyPr>
+            <a:noAutofit/>
+          </a:bodyPr>
+          <a:lstStyle/>
+          <a:p>
+            <a:r>
+              <a:rPr lang="en-US" sz="5400" dirty="0" smtClean="0"/>
+              <a:t>Anemic domain models</a:t>
+            </a:r>
+            <a:endParaRPr lang="en-US" sz="5400" dirty="0"/>
+          </a:p>
+        </p:txBody>
+      </p:sp>
+    </p:spTree>
+    <p:custDataLst>
+      <p:tags r:id="rId1"/>
+    </p:custDataLst>
+    <p:extLst>
+      <p:ext uri="{BB962C8B-B14F-4D97-AF65-F5344CB8AC3E}">
+        <p14:creationId xmlns:p14="http://schemas.microsoft.com/office/powerpoint/2010/main" val="1711875874"/>
+      </p:ext>
+    </p:extLst>
+  </p:cSld>
+  <p:clrMapOvr>
+    <a:masterClrMapping/>
+  </p:clrMapOvr>
+  <p:timing>
+    <p:tnLst>
+      <p:par>
+        <p:cTn id="1" dur="indefinite" restart="never" nodeType="tmRoot"/>
+      </p:par>
+    </p:tnLst>
+  </p:timing>
+</p:sld>
+</file>
+
+<file path=ppt/slides/slide13.xml><?xml version="1.0" encoding="utf-8"?>
+<p:sld xmlns:a="http://schemas.openxmlformats.org/drawingml/2006/main" xmlns:r="http://schemas.openxmlformats.org/officeDocument/2006/relationships" xmlns:p="http://schemas.openxmlformats.org/presentationml/2006/main">
+  <p:cSld>
+    <p:spTree>
+      <p:nvGrpSpPr>
+        <p:cNvPr id="1" name=""/>
+        <p:cNvGrpSpPr/>
+        <p:nvPr/>
+      </p:nvGrpSpPr>
+      <p:grpSpPr>
+        <a:xfrm>
+          <a:off x="0" y="0"/>
+          <a:ext cx="0" cy="0"/>
+          <a:chOff x="0" y="0"/>
+          <a:chExt cx="0" cy="0"/>
+        </a:xfrm>
+      </p:grpSpPr>
+      <p:sp>
+        <p:nvSpPr>
+          <p:cNvPr id="3" name="Text Placeholder 2"/>
+          <p:cNvSpPr>
+            <a:spLocks noGrp="1"/>
+          </p:cNvSpPr>
+          <p:nvPr>
+            <p:ph type="body" idx="1"/>
+            <p:custDataLst>
+              <p:tags r:id="rId2"/>
+            </p:custDataLst>
+          </p:nvPr>
+        </p:nvSpPr>
+        <p:spPr>
+          <a:xfrm>
+            <a:off x="762000" y="2767013"/>
+            <a:ext cx="7772400" cy="1500187"/>
+          </a:xfrm>
+        </p:spPr>
+        <p:txBody>
+          <a:bodyPr>
+            <a:noAutofit/>
+          </a:bodyPr>
+          <a:lstStyle/>
+          <a:p>
+            <a:r>
+              <a:rPr lang="en-US" dirty="0" smtClean="0"/>
+              <a:t>Offer Assignment Service</a:t>
+            </a:r>
+            <a:endParaRPr lang="en-US" dirty="0"/>
+          </a:p>
+        </p:txBody>
+      </p:sp>
+    </p:spTree>
+    <p:custDataLst>
+      <p:tags r:id="rId1"/>
+    </p:custDataLst>
+    <p:extLst>
+      <p:ext uri="{BB962C8B-B14F-4D97-AF65-F5344CB8AC3E}">
+        <p14:creationId xmlns:p14="http://schemas.microsoft.com/office/powerpoint/2010/main" val="1861451711"/>
+      </p:ext>
+    </p:extLst>
+  </p:cSld>
+  <p:clrMapOvr>
+    <a:masterClrMapping/>
+  </p:clrMapOvr>
+  <p:timing>
+    <p:tnLst>
+      <p:par>
+        <p:cTn id="1" dur="indefinite" restart="never" nodeType="tmRoot"/>
+      </p:par>
+    </p:tnLst>
+  </p:timing>
+</p:sld>
+</file>
+
+<file path=ppt/slides/slide14.xml><?xml version="1.0" encoding="utf-8"?>
+<p:sld xmlns:a="http://schemas.openxmlformats.org/drawingml/2006/main" xmlns:r="http://schemas.openxmlformats.org/officeDocument/2006/relationships" xmlns:p="http://schemas.openxmlformats.org/presentationml/2006/main">
+  <p:cSld>
+    <p:spTree>
+      <p:nvGrpSpPr>
+        <p:cNvPr id="1" name=""/>
+        <p:cNvGrpSpPr/>
+        <p:nvPr/>
+      </p:nvGrpSpPr>
+      <p:grpSpPr>
+        <a:xfrm>
+          <a:off x="0" y="0"/>
+          <a:ext cx="0" cy="0"/>
+          <a:chOff x="0" y="0"/>
+          <a:chExt cx="0" cy="0"/>
+        </a:xfrm>
+      </p:grpSpPr>
+      <p:sp>
+        <p:nvSpPr>
+          <p:cNvPr id="2" name="Title 1"/>
+          <p:cNvSpPr>
+            <a:spLocks noGrp="1"/>
+          </p:cNvSpPr>
+          <p:nvPr>
+            <p:ph type="title"/>
+            <p:custDataLst>
+              <p:tags r:id="rId2"/>
+            </p:custDataLst>
+          </p:nvPr>
+        </p:nvSpPr>
+        <p:spPr/>
+        <p:txBody>
+          <a:bodyPr/>
+          <a:lstStyle/>
+          <a:p>
+            <a:endParaRPr lang="en-US"/>
+          </a:p>
+        </p:txBody>
+      </p:sp>
+      <p:pic>
+        <p:nvPicPr>
+          <p:cNvPr id="7170" name="Picture 2"/>
+          <p:cNvPicPr>
+            <a:picLocks noChangeAspect="1" noChangeArrowheads="1"/>
+          </p:cNvPicPr>
+          <p:nvPr>
+            <p:custDataLst>
+              <p:tags r:id="rId3"/>
+            </p:custDataLst>
+          </p:nvPr>
+        </p:nvPicPr>
+        <p:blipFill>
+          <a:blip r:embed="rId5">
+            <a:extLst>
+              <a:ext uri="{28A0092B-C50C-407E-A947-70E740481C1C}">
+                <a14:useLocalDpi xmlns:a14="http://schemas.microsoft.com/office/drawing/2010/main" val="0"/>
+              </a:ext>
+            </a:extLst>
+          </a:blip>
+          <a:srcRect/>
+          <a:stretch>
+            <a:fillRect/>
+          </a:stretch>
+        </p:blipFill>
+        <p:spPr bwMode="auto">
+          <a:xfrm>
+            <a:off x="381000" y="1000125"/>
+            <a:ext cx="8001000" cy="5434642"/>
+          </a:xfrm>
+          <a:prstGeom prst="rect">
+            <a:avLst/>
+          </a:prstGeom>
+          <a:noFill/>
+          <a:ln>
+            <a:noFill/>
+          </a:ln>
+          <a:effectLst/>
+          <a:extLst>
+            <a:ext uri="{909E8E84-426E-40DD-AFC4-6F175D3DCCD1}">
+              <a14:hiddenFill xmlns:a14="http://schemas.microsoft.com/office/drawing/2010/main">
+                <a:solidFill>
+                  <a:schemeClr val="accent1"/>
+                </a:solidFill>
+              </a14:hiddenFill>
+            </a:ext>
+            <a:ext uri="{91240B29-F687-4F45-9708-019B960494DF}">
+              <a14:hiddenLine xmlns:a14="http://schemas.microsoft.com/office/drawing/2010/main" w="9525">
+                <a:solidFill>
+                  <a:schemeClr val="tx1"/>
+                </a:solidFill>
+                <a:miter lim="800000"/>
+                <a:headEnd/>
+                <a:tailEnd/>
+              </a14:hiddenLine>
+            </a:ext>
+            <a:ext uri="{AF507438-7753-43E0-B8FC-AC1667EBCBE1}">
+              <a14:hiddenEffects xmlns:a14="http://schemas.microsoft.com/office/drawing/2010/main">
+                <a:effectLst>
+                  <a:outerShdw dist="35921" dir="2700000" algn="ctr" rotWithShape="0">
+                    <a:schemeClr val="bg2"/>
+                  </a:outerShdw>
+                </a:effectLst>
+              </a14:hiddenEffects>
+            </a:ext>
+          </a:extLst>
+        </p:spPr>
+      </p:pic>
+    </p:spTree>
+    <p:custDataLst>
+      <p:tags r:id="rId1"/>
+    </p:custDataLst>
+    <p:extLst>
+      <p:ext uri="{BB962C8B-B14F-4D97-AF65-F5344CB8AC3E}">
+        <p14:creationId xmlns:p14="http://schemas.microsoft.com/office/powerpoint/2010/main" val="1360281514"/>
+      </p:ext>
+    </p:extLst>
+  </p:cSld>
+  <p:clrMapOvr>
+    <a:masterClrMapping/>
+  </p:clrMapOvr>
+  <p:timing>
+    <p:tnLst>
+      <p:par>
+        <p:cTn id="1" dur="indefinite" restart="never" nodeType="tmRoot"/>
+      </p:par>
+    </p:tnLst>
+  </p:timing>
+</p:sld>
+</file>
+
+<file path=ppt/slides/slide15.xml><?xml version="1.0" encoding="utf-8"?>
+<p:sld xmlns:a="http://schemas.openxmlformats.org/drawingml/2006/main" xmlns:r="http://schemas.openxmlformats.org/officeDocument/2006/relationships" xmlns:p="http://schemas.openxmlformats.org/presentationml/2006/main">
+  <p:cSld>
+    <p:spTree>
+      <p:nvGrpSpPr>
+        <p:cNvPr id="1" name=""/>
+        <p:cNvGrpSpPr/>
+        <p:nvPr/>
+      </p:nvGrpSpPr>
+      <p:grpSpPr>
+        <a:xfrm>
+          <a:off x="0" y="0"/>
+          <a:ext cx="0" cy="0"/>
+          <a:chOff x="0" y="0"/>
+          <a:chExt cx="0" cy="0"/>
+        </a:xfrm>
+      </p:grpSpPr>
+      <p:sp>
+        <p:nvSpPr>
+          <p:cNvPr id="2" name="Title 1"/>
+          <p:cNvSpPr>
+            <a:spLocks noGrp="1"/>
+          </p:cNvSpPr>
+          <p:nvPr>
+            <p:ph type="title"/>
+            <p:custDataLst>
+              <p:tags r:id="rId2"/>
+            </p:custDataLst>
+          </p:nvPr>
+        </p:nvSpPr>
+        <p:spPr/>
+        <p:txBody>
+          <a:bodyPr/>
+          <a:lstStyle/>
+          <a:p>
+            <a:endParaRPr lang="en-US"/>
+          </a:p>
+        </p:txBody>
+      </p:sp>
+      <p:pic>
+        <p:nvPicPr>
+          <p:cNvPr id="8194" name="Picture 2"/>
+          <p:cNvPicPr>
+            <a:picLocks noChangeAspect="1" noChangeArrowheads="1"/>
+          </p:cNvPicPr>
+          <p:nvPr>
+            <p:custDataLst>
+              <p:tags r:id="rId3"/>
+            </p:custDataLst>
+          </p:nvPr>
+        </p:nvPicPr>
+        <p:blipFill>
+          <a:blip r:embed="rId5">
+            <a:extLst>
+              <a:ext uri="{28A0092B-C50C-407E-A947-70E740481C1C}">
+                <a14:useLocalDpi xmlns:a14="http://schemas.microsoft.com/office/drawing/2010/main" val="0"/>
+              </a:ext>
+            </a:extLst>
+          </a:blip>
+          <a:srcRect/>
+          <a:stretch>
+            <a:fillRect/>
+          </a:stretch>
+        </p:blipFill>
+        <p:spPr bwMode="auto">
+          <a:xfrm>
+            <a:off x="76200" y="2438400"/>
+            <a:ext cx="8892988" cy="2362200"/>
+          </a:xfrm>
+          <a:prstGeom prst="rect">
+            <a:avLst/>
+          </a:prstGeom>
+          <a:noFill/>
+          <a:ln>
+            <a:noFill/>
+          </a:ln>
+          <a:effectLst/>
+          <a:extLst>
+            <a:ext uri="{909E8E84-426E-40DD-AFC4-6F175D3DCCD1}">
+              <a14:hiddenFill xmlns:a14="http://schemas.microsoft.com/office/drawing/2010/main">
+                <a:solidFill>
+                  <a:schemeClr val="accent1"/>
+                </a:solidFill>
+              </a14:hiddenFill>
+            </a:ext>
+            <a:ext uri="{91240B29-F687-4F45-9708-019B960494DF}">
+              <a14:hiddenLine xmlns:a14="http://schemas.microsoft.com/office/drawing/2010/main" w="9525">
+                <a:solidFill>
+                  <a:schemeClr val="tx1"/>
+                </a:solidFill>
+                <a:miter lim="800000"/>
+                <a:headEnd/>
+                <a:tailEnd/>
+              </a14:hiddenLine>
+            </a:ext>
+            <a:ext uri="{AF507438-7753-43E0-B8FC-AC1667EBCBE1}">
+              <a14:hiddenEffects xmlns:a14="http://schemas.microsoft.com/office/drawing/2010/main">
+                <a:effectLst>
+                  <a:outerShdw dist="35921" dir="2700000" algn="ctr" rotWithShape="0">
+                    <a:schemeClr val="bg2"/>
+                  </a:outerShdw>
+                </a:effectLst>
+              </a14:hiddenEffects>
+            </a:ext>
+          </a:extLst>
+        </p:spPr>
+      </p:pic>
+    </p:spTree>
+    <p:custDataLst>
+      <p:tags r:id="rId1"/>
+    </p:custDataLst>
+    <p:extLst>
+      <p:ext uri="{BB962C8B-B14F-4D97-AF65-F5344CB8AC3E}">
+        <p14:creationId xmlns:p14="http://schemas.microsoft.com/office/powerpoint/2010/main" val="4027872341"/>
+      </p:ext>
+    </p:extLst>
+  </p:cSld>
+  <p:clrMapOvr>
+    <a:masterClrMapping/>
+  </p:clrMapOvr>
+  <p:timing>
+    <p:tnLst>
+      <p:par>
+        <p:cTn id="1" dur="indefinite" restart="never" nodeType="tmRoot"/>
+      </p:par>
+    </p:tnLst>
+  </p:timing>
+</p:sld>
+</file>
+
+<file path=ppt/slides/slide16.xml><?xml version="1.0" encoding="utf-8"?>
+<p:sld xmlns:a="http://schemas.openxmlformats.org/drawingml/2006/main" xmlns:r="http://schemas.openxmlformats.org/officeDocument/2006/relationships" xmlns:p="http://schemas.openxmlformats.org/presentationml/2006/main">
+  <p:cSld>
+    <p:spTree>
+      <p:nvGrpSpPr>
+        <p:cNvPr id="1" name=""/>
+        <p:cNvGrpSpPr/>
+        <p:nvPr/>
+      </p:nvGrpSpPr>
+      <p:grpSpPr>
+        <a:xfrm>
+          <a:off x="0" y="0"/>
+          <a:ext cx="0" cy="0"/>
+          <a:chOff x="0" y="0"/>
+          <a:chExt cx="0" cy="0"/>
+        </a:xfrm>
+      </p:grpSpPr>
+      <p:sp>
+        <p:nvSpPr>
+          <p:cNvPr id="2" name="Title 1"/>
+          <p:cNvSpPr>
+            <a:spLocks noGrp="1"/>
+          </p:cNvSpPr>
+          <p:nvPr>
+            <p:ph type="title"/>
+            <p:custDataLst>
+              <p:tags r:id="rId2"/>
+            </p:custDataLst>
+          </p:nvPr>
+        </p:nvSpPr>
+        <p:spPr/>
+        <p:txBody>
+          <a:bodyPr/>
+          <a:lstStyle/>
+          <a:p>
+            <a:endParaRPr lang="en-US"/>
+          </a:p>
+        </p:txBody>
+      </p:sp>
+      <p:sp>
+        <p:nvSpPr>
+          <p:cNvPr id="3" name="Text Placeholder 2"/>
+          <p:cNvSpPr>
+            <a:spLocks noGrp="1"/>
+          </p:cNvSpPr>
+          <p:nvPr>
+            <p:ph type="body" idx="1"/>
+            <p:custDataLst>
+              <p:tags r:id="rId3"/>
+            </p:custDataLst>
+          </p:nvPr>
+        </p:nvSpPr>
+        <p:spPr/>
+        <p:txBody>
+          <a:bodyPr/>
+          <a:lstStyle/>
+          <a:p>
+            <a:endParaRPr lang="en-US"/>
+          </a:p>
+        </p:txBody>
+      </p:sp>
+      <p:pic>
+        <p:nvPicPr>
+          <p:cNvPr id="9218" name="Picture 2"/>
+          <p:cNvPicPr>
+            <a:picLocks noChangeAspect="1" noChangeArrowheads="1"/>
+          </p:cNvPicPr>
+          <p:nvPr>
+            <p:custDataLst>
+              <p:tags r:id="rId4"/>
+            </p:custDataLst>
+          </p:nvPr>
+        </p:nvPicPr>
+        <p:blipFill>
+          <a:blip r:embed="rId6">
+            <a:extLst>
+              <a:ext uri="{28A0092B-C50C-407E-A947-70E740481C1C}">
+                <a14:useLocalDpi xmlns:a14="http://schemas.microsoft.com/office/drawing/2010/main" val="0"/>
+              </a:ext>
+            </a:extLst>
+          </a:blip>
+          <a:srcRect/>
+          <a:stretch>
+            <a:fillRect/>
+          </a:stretch>
+        </p:blipFill>
+        <p:spPr bwMode="auto">
+          <a:xfrm>
+            <a:off x="228600" y="1219200"/>
+            <a:ext cx="8780501" cy="4953000"/>
+          </a:xfrm>
+          <a:prstGeom prst="rect">
+            <a:avLst/>
+          </a:prstGeom>
+          <a:noFill/>
+          <a:ln>
+            <a:noFill/>
+          </a:ln>
+          <a:effectLst/>
+          <a:extLst>
+            <a:ext uri="{909E8E84-426E-40DD-AFC4-6F175D3DCCD1}">
+              <a14:hiddenFill xmlns:a14="http://schemas.microsoft.com/office/drawing/2010/main">
+                <a:solidFill>
+                  <a:schemeClr val="accent1"/>
+                </a:solidFill>
+              </a14:hiddenFill>
+            </a:ext>
+            <a:ext uri="{91240B29-F687-4F45-9708-019B960494DF}">
+              <a14:hiddenLine xmlns:a14="http://schemas.microsoft.com/office/drawing/2010/main" w="9525">
+                <a:solidFill>
+                  <a:schemeClr val="tx1"/>
+                </a:solidFill>
+                <a:miter lim="800000"/>
+                <a:headEnd/>
+                <a:tailEnd/>
+              </a14:hiddenLine>
+            </a:ext>
+            <a:ext uri="{AF507438-7753-43E0-B8FC-AC1667EBCBE1}">
+              <a14:hiddenEffects xmlns:a14="http://schemas.microsoft.com/office/drawing/2010/main">
+                <a:effectLst>
+                  <a:outerShdw dist="35921" dir="2700000" algn="ctr" rotWithShape="0">
+                    <a:schemeClr val="bg2"/>
+                  </a:outerShdw>
+                </a:effectLst>
+              </a14:hiddenEffects>
+            </a:ext>
+          </a:extLst>
+        </p:spPr>
+      </p:pic>
+    </p:spTree>
+    <p:custDataLst>
+      <p:tags r:id="rId1"/>
+    </p:custDataLst>
+    <p:extLst>
+      <p:ext uri="{BB962C8B-B14F-4D97-AF65-F5344CB8AC3E}">
+        <p14:creationId xmlns:p14="http://schemas.microsoft.com/office/powerpoint/2010/main" val="3562491923"/>
+      </p:ext>
+    </p:extLst>
+  </p:cSld>
+  <p:clrMapOvr>
+    <a:masterClrMapping/>
+  </p:clrMapOvr>
+  <p:timing>
+    <p:tnLst>
+      <p:par>
+        <p:cTn id="1" dur="indefinite" restart="never" nodeType="tmRoot"/>
+      </p:par>
+    </p:tnLst>
+  </p:timing>
+</p:sld>
+</file>
+
+<file path=ppt/slides/slide17.xml><?xml version="1.0" encoding="utf-8"?>
+<p:sld xmlns:a="http://schemas.openxmlformats.org/drawingml/2006/main" xmlns:r="http://schemas.openxmlformats.org/officeDocument/2006/relationships" xmlns:p="http://schemas.openxmlformats.org/presentationml/2006/main">
+  <p:cSld>
+    <p:spTree>
+      <p:nvGrpSpPr>
+        <p:cNvPr id="1" name=""/>
+        <p:cNvGrpSpPr/>
+        <p:nvPr/>
+      </p:nvGrpSpPr>
+      <p:grpSpPr>
+        <a:xfrm>
+          <a:off x="0" y="0"/>
+          <a:ext cx="0" cy="0"/>
+          <a:chOff x="0" y="0"/>
+          <a:chExt cx="0" cy="0"/>
+        </a:xfrm>
+      </p:grpSpPr>
+      <p:sp>
+        <p:nvSpPr>
+          <p:cNvPr id="2" name="Title 1"/>
+          <p:cNvSpPr>
+            <a:spLocks noGrp="1"/>
+          </p:cNvSpPr>
+          <p:nvPr>
+            <p:ph type="title"/>
+            <p:custDataLst>
+              <p:tags r:id="rId2"/>
+            </p:custDataLst>
+          </p:nvPr>
+        </p:nvSpPr>
+        <p:spPr/>
+        <p:txBody>
+          <a:bodyPr/>
+          <a:lstStyle/>
+          <a:p>
+            <a:endParaRPr lang="en-US"/>
+          </a:p>
+        </p:txBody>
+      </p:sp>
+      <p:pic>
+        <p:nvPicPr>
+          <p:cNvPr id="10242" name="Picture 2"/>
+          <p:cNvPicPr>
+            <a:picLocks noChangeAspect="1" noChangeArrowheads="1"/>
+          </p:cNvPicPr>
+          <p:nvPr>
+            <p:custDataLst>
+              <p:tags r:id="rId3"/>
+            </p:custDataLst>
+          </p:nvPr>
+        </p:nvPicPr>
+        <p:blipFill>
+          <a:blip r:embed="rId5">
+            <a:extLst>
+              <a:ext uri="{28A0092B-C50C-407E-A947-70E740481C1C}">
+                <a14:useLocalDpi xmlns:a14="http://schemas.microsoft.com/office/drawing/2010/main" val="0"/>
+              </a:ext>
+            </a:extLst>
+          </a:blip>
+          <a:srcRect/>
+          <a:stretch>
+            <a:fillRect/>
+          </a:stretch>
+        </p:blipFill>
+        <p:spPr bwMode="auto">
+          <a:xfrm>
+            <a:off x="1066800" y="1144979"/>
+            <a:ext cx="6858000" cy="4926169"/>
+          </a:xfrm>
+          <a:prstGeom prst="rect">
+            <a:avLst/>
+          </a:prstGeom>
+          <a:noFill/>
+          <a:ln>
+            <a:noFill/>
+          </a:ln>
+          <a:effectLst/>
+          <a:extLst>
+            <a:ext uri="{909E8E84-426E-40DD-AFC4-6F175D3DCCD1}">
+              <a14:hiddenFill xmlns:a14="http://schemas.microsoft.com/office/drawing/2010/main">
+                <a:solidFill>
+                  <a:schemeClr val="accent1"/>
+                </a:solidFill>
+              </a14:hiddenFill>
+            </a:ext>
+            <a:ext uri="{91240B29-F687-4F45-9708-019B960494DF}">
+              <a14:hiddenLine xmlns:a14="http://schemas.microsoft.com/office/drawing/2010/main" w="9525">
+                <a:solidFill>
+                  <a:schemeClr val="tx1"/>
+                </a:solidFill>
+                <a:miter lim="800000"/>
+                <a:headEnd/>
+                <a:tailEnd/>
+              </a14:hiddenLine>
+            </a:ext>
+            <a:ext uri="{AF507438-7753-43E0-B8FC-AC1667EBCBE1}">
+              <a14:hiddenEffects xmlns:a14="http://schemas.microsoft.com/office/drawing/2010/main">
+                <a:effectLst>
+                  <a:outerShdw dist="35921" dir="2700000" algn="ctr" rotWithShape="0">
+                    <a:schemeClr val="bg2"/>
+                  </a:outerShdw>
+                </a:effectLst>
+              </a14:hiddenEffects>
+            </a:ext>
+          </a:extLst>
+        </p:spPr>
+      </p:pic>
+    </p:spTree>
+    <p:custDataLst>
+      <p:tags r:id="rId1"/>
+    </p:custDataLst>
+    <p:extLst>
+      <p:ext uri="{BB962C8B-B14F-4D97-AF65-F5344CB8AC3E}">
+        <p14:creationId xmlns:p14="http://schemas.microsoft.com/office/powerpoint/2010/main" val="3251861078"/>
+      </p:ext>
+    </p:extLst>
+  </p:cSld>
+  <p:clrMapOvr>
+    <a:masterClrMapping/>
+  </p:clrMapOvr>
+  <p:timing>
+    <p:tnLst>
+      <p:par>
+        <p:cTn id="1" dur="indefinite" restart="never" nodeType="tmRoot"/>
+      </p:par>
+    </p:tnLst>
+  </p:timing>
+</p:sld>
+</file>
+
+<file path=ppt/slides/slide18.xml><?xml version="1.0" encoding="utf-8"?>
+<p:sld xmlns:a="http://schemas.openxmlformats.org/drawingml/2006/main" xmlns:r="http://schemas.openxmlformats.org/officeDocument/2006/relationships" xmlns:p="http://schemas.openxmlformats.org/presentationml/2006/main">
+  <p:cSld>
+    <p:spTree>
+      <p:nvGrpSpPr>
+        <p:cNvPr id="1" name=""/>
+        <p:cNvGrpSpPr/>
+        <p:nvPr/>
+      </p:nvGrpSpPr>
+      <p:grpSpPr>
+        <a:xfrm>
+          <a:off x="0" y="0"/>
+          <a:ext cx="0" cy="0"/>
+          <a:chOff x="0" y="0"/>
+          <a:chExt cx="0" cy="0"/>
+        </a:xfrm>
+      </p:grpSpPr>
+      <p:sp>
+        <p:nvSpPr>
+          <p:cNvPr id="2" name="Title 1"/>
+          <p:cNvSpPr>
+            <a:spLocks noGrp="1"/>
+          </p:cNvSpPr>
+          <p:nvPr>
+            <p:ph type="title"/>
+            <p:custDataLst>
+              <p:tags r:id="rId2"/>
+            </p:custDataLst>
+          </p:nvPr>
+        </p:nvSpPr>
+        <p:spPr/>
+        <p:txBody>
+          <a:bodyPr/>
+          <a:lstStyle/>
+          <a:p>
+            <a:endParaRPr lang="en-US"/>
+          </a:p>
+        </p:txBody>
+      </p:sp>
+      <p:pic>
+        <p:nvPicPr>
+          <p:cNvPr id="11266" name="Picture 2"/>
+          <p:cNvPicPr>
+            <a:picLocks noChangeAspect="1" noChangeArrowheads="1"/>
+          </p:cNvPicPr>
+          <p:nvPr>
+            <p:custDataLst>
+              <p:tags r:id="rId3"/>
+            </p:custDataLst>
+          </p:nvPr>
+        </p:nvPicPr>
+        <p:blipFill>
+          <a:blip r:embed="rId5">
+            <a:extLst>
+              <a:ext uri="{28A0092B-C50C-407E-A947-70E740481C1C}">
+                <a14:useLocalDpi xmlns:a14="http://schemas.microsoft.com/office/drawing/2010/main" val="0"/>
+              </a:ext>
+            </a:extLst>
+          </a:blip>
+          <a:srcRect/>
+          <a:stretch>
+            <a:fillRect/>
+          </a:stretch>
+        </p:blipFill>
+        <p:spPr bwMode="auto">
+          <a:xfrm>
+            <a:off x="1066800" y="1143000"/>
+            <a:ext cx="6789270" cy="4876800"/>
+          </a:xfrm>
+          <a:prstGeom prst="rect">
+            <a:avLst/>
+          </a:prstGeom>
+          <a:noFill/>
+          <a:ln>
+            <a:noFill/>
+          </a:ln>
+          <a:effectLst/>
+          <a:extLst>
+            <a:ext uri="{909E8E84-426E-40DD-AFC4-6F175D3DCCD1}">
+              <a14:hiddenFill xmlns:a14="http://schemas.microsoft.com/office/drawing/2010/main">
+                <a:solidFill>
+                  <a:schemeClr val="accent1"/>
+                </a:solidFill>
+              </a14:hiddenFill>
+            </a:ext>
+            <a:ext uri="{91240B29-F687-4F45-9708-019B960494DF}">
+              <a14:hiddenLine xmlns:a14="http://schemas.microsoft.com/office/drawing/2010/main" w="9525">
+                <a:solidFill>
+                  <a:schemeClr val="tx1"/>
+                </a:solidFill>
+                <a:miter lim="800000"/>
+                <a:headEnd/>
+                <a:tailEnd/>
+              </a14:hiddenLine>
+            </a:ext>
+            <a:ext uri="{AF507438-7753-43E0-B8FC-AC1667EBCBE1}">
+              <a14:hiddenEffects xmlns:a14="http://schemas.microsoft.com/office/drawing/2010/main">
+                <a:effectLst>
+                  <a:outerShdw dist="35921" dir="2700000" algn="ctr" rotWithShape="0">
+                    <a:schemeClr val="bg2"/>
+                  </a:outerShdw>
+                </a:effectLst>
+              </a14:hiddenEffects>
+            </a:ext>
+          </a:extLst>
+        </p:spPr>
+      </p:pic>
+    </p:spTree>
+    <p:custDataLst>
+      <p:tags r:id="rId1"/>
+    </p:custDataLst>
+    <p:extLst>
+      <p:ext uri="{BB962C8B-B14F-4D97-AF65-F5344CB8AC3E}">
+        <p14:creationId xmlns:p14="http://schemas.microsoft.com/office/powerpoint/2010/main" val="2763436465"/>
+      </p:ext>
+    </p:extLst>
+  </p:cSld>
+  <p:clrMapOvr>
+    <a:masterClrMapping/>
+  </p:clrMapOvr>
+  <p:timing>
+    <p:tnLst>
+      <p:par>
+        <p:cTn id="1" dur="indefinite" restart="never" nodeType="tmRoot"/>
+      </p:par>
+    </p:tnLst>
+  </p:timing>
+</p:sld>
+</file>
+
+<file path=ppt/slides/slide19.xml><?xml version="1.0" encoding="utf-8"?>
+<p:sld xmlns:a="http://schemas.openxmlformats.org/drawingml/2006/main" xmlns:r="http://schemas.openxmlformats.org/officeDocument/2006/relationships" xmlns:p="http://schemas.openxmlformats.org/presentationml/2006/main">
+  <p:cSld>
+    <p:spTree>
+      <p:nvGrpSpPr>
+        <p:cNvPr id="1" name=""/>
+        <p:cNvGrpSpPr/>
+        <p:nvPr/>
+      </p:nvGrpSpPr>
+      <p:grpSpPr>
+        <a:xfrm>
+          <a:off x="0" y="0"/>
+          <a:ext cx="0" cy="0"/>
+          <a:chOff x="0" y="0"/>
+          <a:chExt cx="0" cy="0"/>
+        </a:xfrm>
+      </p:grpSpPr>
+      <p:sp>
+        <p:nvSpPr>
+          <p:cNvPr id="3" name="Text Placeholder 2"/>
+          <p:cNvSpPr>
+            <a:spLocks noGrp="1"/>
+          </p:cNvSpPr>
+          <p:nvPr>
+            <p:ph type="body" idx="1"/>
+            <p:custDataLst>
+              <p:tags r:id="rId2"/>
+            </p:custDataLst>
+          </p:nvPr>
+        </p:nvSpPr>
+        <p:spPr>
+          <a:xfrm>
+            <a:off x="762000" y="2767013"/>
+            <a:ext cx="7772400" cy="1500187"/>
+          </a:xfrm>
+        </p:spPr>
+        <p:txBody>
+          <a:bodyPr>
+            <a:noAutofit/>
+          </a:bodyPr>
+          <a:lstStyle/>
+          <a:p>
+            <a:r>
+              <a:rPr lang="en-US" sz="8800" dirty="0" smtClean="0"/>
+              <a:t>Solution</a:t>
+            </a:r>
+            <a:endParaRPr lang="en-US" sz="8800" dirty="0"/>
+          </a:p>
+        </p:txBody>
+      </p:sp>
+    </p:spTree>
+    <p:custDataLst>
+      <p:tags r:id="rId1"/>
+    </p:custDataLst>
+    <p:extLst>
+      <p:ext uri="{BB962C8B-B14F-4D97-AF65-F5344CB8AC3E}">
+        <p14:creationId xmlns:p14="http://schemas.microsoft.com/office/powerpoint/2010/main" val="3440422625"/>
+      </p:ext>
+    </p:extLst>
+  </p:cSld>
+  <p:clrMapOvr>
+    <a:masterClrMapping/>
+  </p:clrMapOvr>
+  <p:timing>
+    <p:tnLst>
+      <p:par>
+        <p:cTn id="1" dur="indefinite" restart="never" nodeType="tmRoot"/>
+      </p:par>
+    </p:tnLst>
+  </p:timing>
+</p:sld>
+</file>
+
+<file path=ppt/slides/slide2.xml><?xml version="1.0" encoding="utf-8"?>
+<p:sld xmlns:a="http://schemas.openxmlformats.org/drawingml/2006/main" xmlns:r="http://schemas.openxmlformats.org/officeDocument/2006/relationships" xmlns:p="http://schemas.openxmlformats.org/presentationml/2006/main">
+  <p:cSld>
+    <p:spTree>
+      <p:nvGrpSpPr>
+        <p:cNvPr id="1" name=""/>
+        <p:cNvGrpSpPr/>
+        <p:nvPr/>
+      </p:nvGrpSpPr>
+      <p:grpSpPr>
+        <a:xfrm>
+          <a:off x="0" y="0"/>
+          <a:ext cx="0" cy="0"/>
+          <a:chOff x="0" y="0"/>
+          <a:chExt cx="0" cy="0"/>
+        </a:xfrm>
+      </p:grpSpPr>
+      <p:sp>
+        <p:nvSpPr>
+          <p:cNvPr id="3" name="Text Placeholder 2"/>
+          <p:cNvSpPr>
+            <a:spLocks noGrp="1"/>
+          </p:cNvSpPr>
+          <p:nvPr>
+            <p:ph type="body" idx="1"/>
+            <p:custDataLst>
+              <p:tags r:id="rId2"/>
+            </p:custDataLst>
+          </p:nvPr>
+        </p:nvSpPr>
+        <p:spPr>
+          <a:xfrm>
+            <a:off x="762000" y="2767013"/>
+            <a:ext cx="7772400" cy="1500187"/>
+          </a:xfrm>
+        </p:spPr>
+        <p:txBody>
+          <a:bodyPr>
+            <a:noAutofit/>
+          </a:bodyPr>
+          <a:lstStyle/>
+          <a:p>
+            <a:r>
+              <a:rPr lang="en-US" dirty="0" smtClean="0"/>
+              <a:t>What is a domain model?</a:t>
+            </a:r>
+            <a:endParaRPr lang="en-US" dirty="0"/>
+          </a:p>
+        </p:txBody>
+      </p:sp>
+    </p:spTree>
+    <p:custDataLst>
+      <p:tags r:id="rId1"/>
+    </p:custDataLst>
+    <p:extLst>
+      <p:ext uri="{BB962C8B-B14F-4D97-AF65-F5344CB8AC3E}">
+        <p14:creationId xmlns:p14="http://schemas.microsoft.com/office/powerpoint/2010/main" val="2234195537"/>
+      </p:ext>
+    </p:extLst>
+  </p:cSld>
+  <p:clrMapOvr>
+    <a:masterClrMapping/>
+  </p:clrMapOvr>
+  <p:timing>
+    <p:tnLst>
+      <p:par>
+        <p:cTn id="1" dur="indefinite" restart="never" nodeType="tmRoot"/>
+      </p:par>
+    </p:tnLst>
+  </p:timing>
+</p:sld>
+</file>
+
+<file path=ppt/slides/slide3.xml><?xml version="1.0" encoding="utf-8"?>
+<p:sld xmlns:a="http://schemas.openxmlformats.org/drawingml/2006/main" xmlns:r="http://schemas.openxmlformats.org/officeDocument/2006/relationships" xmlns:p="http://schemas.openxmlformats.org/presentationml/2006/main">
+  <p:cSld>
+    <p:spTree>
+      <p:nvGrpSpPr>
+        <p:cNvPr id="1" name=""/>
+        <p:cNvGrpSpPr/>
+        <p:nvPr/>
+      </p:nvGrpSpPr>
+      <p:grpSpPr>
+        <a:xfrm>
+          <a:off x="0" y="0"/>
+          <a:ext cx="0" cy="0"/>
+          <a:chOff x="0" y="0"/>
+          <a:chExt cx="0" cy="0"/>
+        </a:xfrm>
+      </p:grpSpPr>
+      <p:sp>
+        <p:nvSpPr>
+          <p:cNvPr id="3" name="Text Placeholder 2"/>
+          <p:cNvSpPr>
+            <a:spLocks noGrp="1"/>
+          </p:cNvSpPr>
+          <p:nvPr>
+            <p:ph type="body" idx="1"/>
+            <p:custDataLst>
+              <p:tags r:id="rId2"/>
+            </p:custDataLst>
+          </p:nvPr>
+        </p:nvSpPr>
+        <p:spPr>
+          <a:xfrm>
+            <a:off x="762000" y="2767013"/>
+            <a:ext cx="7772400" cy="1500187"/>
+          </a:xfrm>
+        </p:spPr>
+        <p:txBody>
+          <a:bodyPr>
+            <a:noAutofit/>
+          </a:bodyPr>
+          <a:lstStyle/>
+          <a:p>
+            <a:r>
+              <a:rPr lang="en-US" sz="6000" dirty="0" smtClean="0"/>
+              <a:t>Why should I care?</a:t>
+            </a:r>
+            <a:endParaRPr lang="en-US" sz="6000" dirty="0"/>
+          </a:p>
+        </p:txBody>
+      </p:sp>
+    </p:spTree>
+    <p:custDataLst>
+      <p:tags r:id="rId1"/>
+    </p:custDataLst>
+    <p:extLst>
+      <p:ext uri="{BB962C8B-B14F-4D97-AF65-F5344CB8AC3E}">
+        <p14:creationId xmlns:p14="http://schemas.microsoft.com/office/powerpoint/2010/main" val="3584807295"/>
+      </p:ext>
+    </p:extLst>
+  </p:cSld>
+  <p:clrMapOvr>
+    <a:masterClrMapping/>
+  </p:clrMapOvr>
+  <p:timing>
+    <p:tnLst>
+      <p:par>
+        <p:cTn id="1" dur="indefinite" restart="never" nodeType="tmRoot"/>
+      </p:par>
+    </p:tnLst>
+  </p:timing>
+</p:sld>
+</file>
+
+<file path=ppt/slides/slide4.xml><?xml version="1.0" encoding="utf-8"?>
+<p:sld xmlns:a="http://schemas.openxmlformats.org/drawingml/2006/main" xmlns:r="http://schemas.openxmlformats.org/officeDocument/2006/relationships" xmlns:p="http://schemas.openxmlformats.org/presentationml/2006/main">
+  <p:cSld>
+    <p:spTree>
+      <p:nvGrpSpPr>
+        <p:cNvPr id="1" name=""/>
+        <p:cNvGrpSpPr/>
+        <p:nvPr/>
+      </p:nvGrpSpPr>
+      <p:grpSpPr>
+        <a:xfrm>
+          <a:off x="0" y="0"/>
+          <a:ext cx="0" cy="0"/>
+          <a:chOff x="0" y="0"/>
+          <a:chExt cx="0" cy="0"/>
+        </a:xfrm>
+      </p:grpSpPr>
+      <p:sp>
+        <p:nvSpPr>
+          <p:cNvPr id="3" name="Text Placeholder 2"/>
+          <p:cNvSpPr>
+            <a:spLocks noGrp="1"/>
+          </p:cNvSpPr>
+          <p:nvPr>
+            <p:ph type="body" idx="1"/>
+            <p:custDataLst>
+              <p:tags r:id="rId2"/>
+            </p:custDataLst>
+          </p:nvPr>
+        </p:nvSpPr>
+        <p:spPr>
+          <a:xfrm>
+            <a:off x="762000" y="2767013"/>
+            <a:ext cx="7772400" cy="1500187"/>
+          </a:xfrm>
+        </p:spPr>
+        <p:txBody>
+          <a:bodyPr>
+            <a:noAutofit/>
+          </a:bodyPr>
+          <a:lstStyle/>
+          <a:p>
+            <a:r>
+              <a:rPr lang="en-US" sz="8800" dirty="0" smtClean="0"/>
+              <a:t>Current State</a:t>
+            </a:r>
+            <a:endParaRPr lang="en-US" sz="8800" dirty="0"/>
+          </a:p>
+        </p:txBody>
+      </p:sp>
+    </p:spTree>
+    <p:custDataLst>
+      <p:tags r:id="rId1"/>
+    </p:custDataLst>
+    <p:extLst>
+      <p:ext uri="{BB962C8B-B14F-4D97-AF65-F5344CB8AC3E}">
+        <p14:creationId xmlns:p14="http://schemas.microsoft.com/office/powerpoint/2010/main" val="2454386320"/>
+      </p:ext>
+    </p:extLst>
+  </p:cSld>
+  <p:clrMapOvr>
+    <a:masterClrMapping/>
+  </p:clrMapOvr>
+  <p:timing>
+    <p:tnLst>
+      <p:par>
+        <p:cTn id="1" dur="indefinite" restart="never" nodeType="tmRoot"/>
+      </p:par>
+    </p:tnLst>
+  </p:timing>
+</p:sld>
+</file>
+
+<file path=ppt/slides/slide5.xml><?xml version="1.0" encoding="utf-8"?>
+<p:sld xmlns:a="http://schemas.openxmlformats.org/drawingml/2006/main" xmlns:r="http://schemas.openxmlformats.org/officeDocument/2006/relationships" xmlns:p="http://schemas.openxmlformats.org/presentationml/2006/main">
+  <p:cSld>
+    <p:spTree>
+      <p:nvGrpSpPr>
+        <p:cNvPr id="1" name=""/>
+        <p:cNvGrpSpPr/>
+        <p:nvPr/>
+      </p:nvGrpSpPr>
+      <p:grpSpPr>
+        <a:xfrm>
+          <a:off x="0" y="0"/>
+          <a:ext cx="0" cy="0"/>
+          <a:chOff x="0" y="0"/>
+          <a:chExt cx="0" cy="0"/>
+        </a:xfrm>
+      </p:grpSpPr>
+      <p:pic>
+        <p:nvPicPr>
+          <p:cNvPr id="3074" name="Picture 2"/>
+          <p:cNvPicPr>
+            <a:picLocks noChangeAspect="1" noChangeArrowheads="1"/>
+          </p:cNvPicPr>
+          <p:nvPr>
+            <p:custDataLst>
+              <p:tags r:id="rId2"/>
+            </p:custDataLst>
+          </p:nvPr>
+        </p:nvPicPr>
+        <p:blipFill>
+          <a:blip r:embed="rId5">
+            <a:extLst>
+              <a:ext uri="{28A0092B-C50C-407E-A947-70E740481C1C}">
+                <a14:useLocalDpi xmlns:a14="http://schemas.microsoft.com/office/drawing/2010/main" val="0"/>
+              </a:ext>
+            </a:extLst>
+          </a:blip>
+          <a:srcRect/>
+          <a:stretch>
+            <a:fillRect/>
+          </a:stretch>
+        </p:blipFill>
+        <p:spPr bwMode="auto">
+          <a:xfrm>
+            <a:off x="71207" y="1180605"/>
+            <a:ext cx="8996593" cy="4565214"/>
+          </a:xfrm>
+          <a:prstGeom prst="rect">
+            <a:avLst/>
+          </a:prstGeom>
+          <a:noFill/>
+          <a:ln>
+            <a:noFill/>
+          </a:ln>
+          <a:effectLst/>
+          <a:extLst>
+            <a:ext uri="{909E8E84-426E-40DD-AFC4-6F175D3DCCD1}">
+              <a14:hiddenFill xmlns:a14="http://schemas.microsoft.com/office/drawing/2010/main">
+                <a:solidFill>
+                  <a:schemeClr val="accent1"/>
+                </a:solidFill>
+              </a14:hiddenFill>
+            </a:ext>
+            <a:ext uri="{91240B29-F687-4F45-9708-019B960494DF}">
+              <a14:hiddenLine xmlns:a14="http://schemas.microsoft.com/office/drawing/2010/main" w="9525">
+                <a:solidFill>
+                  <a:schemeClr val="tx1"/>
+                </a:solidFill>
+                <a:miter lim="800000"/>
+                <a:headEnd/>
+                <a:tailEnd/>
+              </a14:hiddenLine>
+            </a:ext>
+            <a:ext uri="{AF507438-7753-43E0-B8FC-AC1667EBCBE1}">
+              <a14:hiddenEffects xmlns:a14="http://schemas.microsoft.com/office/drawing/2010/main">
+                <a:effectLst>
+                  <a:outerShdw dist="35921" dir="2700000" algn="ctr" rotWithShape="0">
+                    <a:schemeClr val="bg2"/>
+                  </a:outerShdw>
+                </a:effectLst>
+              </a14:hiddenEffects>
+            </a:ext>
+          </a:extLst>
+        </p:spPr>
+      </p:pic>
+    </p:spTree>
+    <p:custDataLst>
+      <p:tags r:id="rId1"/>
+    </p:custDataLst>
+    <p:extLst>
+      <p:ext uri="{BB962C8B-B14F-4D97-AF65-F5344CB8AC3E}">
+        <p14:creationId xmlns:p14="http://schemas.microsoft.com/office/powerpoint/2010/main" val="392081175"/>
+      </p:ext>
+    </p:extLst>
+  </p:cSld>
+  <p:clrMapOvr>
+    <a:masterClrMapping/>
+  </p:clrMapOvr>
+  <p:timing>
+    <p:tnLst>
+      <p:par>
+        <p:cTn id="1" dur="indefinite" restart="never" nodeType="tmRoot"/>
+      </p:par>
+    </p:tnLst>
+  </p:timing>
+</p:sld>
+</file>
+
+<file path=ppt/slides/slide6.xml><?xml version="1.0" encoding="utf-8"?>
+<p:sld xmlns:a="http://schemas.openxmlformats.org/drawingml/2006/main" xmlns:r="http://schemas.openxmlformats.org/officeDocument/2006/relationships" xmlns:p="http://schemas.openxmlformats.org/presentationml/2006/main">
+  <p:cSld>
+    <p:spTree>
+      <p:nvGrpSpPr>
+        <p:cNvPr id="1" name=""/>
+        <p:cNvGrpSpPr/>
+        <p:nvPr/>
+      </p:nvGrpSpPr>
+      <p:grpSpPr>
+        <a:xfrm>
+          <a:off x="0" y="0"/>
+          <a:ext cx="0" cy="0"/>
+          <a:chOff x="0" y="0"/>
+          <a:chExt cx="0" cy="0"/>
+        </a:xfrm>
+      </p:grpSpPr>
+      <p:pic>
+        <p:nvPicPr>
+          <p:cNvPr id="4098" name="Picture 2"/>
+          <p:cNvPicPr>
+            <a:picLocks noChangeAspect="1" noChangeArrowheads="1"/>
+          </p:cNvPicPr>
+          <p:nvPr>
+            <p:custDataLst>
+              <p:tags r:id="rId2"/>
+            </p:custDataLst>
+          </p:nvPr>
+        </p:nvPicPr>
+        <p:blipFill>
+          <a:blip r:embed="rId5">
+            <a:extLst>
+              <a:ext uri="{28A0092B-C50C-407E-A947-70E740481C1C}">
+                <a14:useLocalDpi xmlns:a14="http://schemas.microsoft.com/office/drawing/2010/main" val="0"/>
+              </a:ext>
+            </a:extLst>
+          </a:blip>
+          <a:srcRect/>
+          <a:stretch>
+            <a:fillRect/>
+          </a:stretch>
+        </p:blipFill>
+        <p:spPr bwMode="auto">
+          <a:xfrm>
+            <a:off x="28074" y="1981200"/>
+            <a:ext cx="9039726" cy="3200400"/>
+          </a:xfrm>
+          <a:prstGeom prst="rect">
+            <a:avLst/>
+          </a:prstGeom>
+          <a:noFill/>
+          <a:ln>
+            <a:noFill/>
+          </a:ln>
+          <a:effectLst/>
+          <a:extLst>
+            <a:ext uri="{909E8E84-426E-40DD-AFC4-6F175D3DCCD1}">
+              <a14:hiddenFill xmlns:a14="http://schemas.microsoft.com/office/drawing/2010/main">
+                <a:solidFill>
+                  <a:schemeClr val="accent1"/>
+                </a:solidFill>
+              </a14:hiddenFill>
+            </a:ext>
+            <a:ext uri="{91240B29-F687-4F45-9708-019B960494DF}">
+              <a14:hiddenLine xmlns:a14="http://schemas.microsoft.com/office/drawing/2010/main" w="9525">
+                <a:solidFill>
+                  <a:schemeClr val="tx1"/>
+                </a:solidFill>
+                <a:miter lim="800000"/>
+                <a:headEnd/>
+                <a:tailEnd/>
+              </a14:hiddenLine>
+            </a:ext>
+            <a:ext uri="{AF507438-7753-43E0-B8FC-AC1667EBCBE1}">
+              <a14:hiddenEffects xmlns:a14="http://schemas.microsoft.com/office/drawing/2010/main">
+                <a:effectLst>
+                  <a:outerShdw dist="35921" dir="2700000" algn="ctr" rotWithShape="0">
+                    <a:schemeClr val="bg2"/>
+                  </a:outerShdw>
+                </a:effectLst>
+              </a14:hiddenEffects>
+            </a:ext>
+          </a:extLst>
+        </p:spPr>
+      </p:pic>
+    </p:spTree>
+    <p:custDataLst>
+      <p:tags r:id="rId1"/>
+    </p:custDataLst>
+    <p:extLst>
+      <p:ext uri="{BB962C8B-B14F-4D97-AF65-F5344CB8AC3E}">
+        <p14:creationId xmlns:p14="http://schemas.microsoft.com/office/powerpoint/2010/main" val="3521129657"/>
+      </p:ext>
+    </p:extLst>
+  </p:cSld>
+  <p:clrMapOvr>
+    <a:masterClrMapping/>
+  </p:clrMapOvr>
+  <p:timing>
+    <p:tnLst>
+      <p:par>
+        <p:cTn id="1" dur="indefinite" restart="never" nodeType="tmRoot"/>
+      </p:par>
+    </p:tnLst>
+  </p:timing>
+</p:sld>
+</file>
+
+<file path=ppt/slides/slide7.xml><?xml version="1.0" encoding="utf-8"?>
+<p:sld xmlns:a="http://schemas.openxmlformats.org/drawingml/2006/main" xmlns:r="http://schemas.openxmlformats.org/officeDocument/2006/relationships" xmlns:p="http://schemas.openxmlformats.org/presentationml/2006/main">
+  <p:cSld>
+    <p:spTree>
+      <p:nvGrpSpPr>
+        <p:cNvPr id="1" name=""/>
+        <p:cNvGrpSpPr/>
+        <p:nvPr/>
+      </p:nvGrpSpPr>
+      <p:grpSpPr>
+        <a:xfrm>
+          <a:off x="0" y="0"/>
+          <a:ext cx="0" cy="0"/>
+          <a:chOff x="0" y="0"/>
+          <a:chExt cx="0" cy="0"/>
+        </a:xfrm>
+      </p:grpSpPr>
+      <p:pic>
+        <p:nvPicPr>
+          <p:cNvPr id="5122" name="Picture 2"/>
+          <p:cNvPicPr>
+            <a:picLocks noChangeAspect="1" noChangeArrowheads="1"/>
+          </p:cNvPicPr>
+          <p:nvPr>
+            <p:custDataLst>
+              <p:tags r:id="rId2"/>
+            </p:custDataLst>
+          </p:nvPr>
+        </p:nvPicPr>
+        <p:blipFill>
+          <a:blip r:embed="rId5">
+            <a:extLst>
+              <a:ext uri="{28A0092B-C50C-407E-A947-70E740481C1C}">
+                <a14:useLocalDpi xmlns:a14="http://schemas.microsoft.com/office/drawing/2010/main" val="0"/>
+              </a:ext>
+            </a:extLst>
+          </a:blip>
+          <a:srcRect/>
+          <a:stretch>
+            <a:fillRect/>
+          </a:stretch>
+        </p:blipFill>
+        <p:spPr bwMode="auto">
+          <a:xfrm>
+            <a:off x="152400" y="2133600"/>
+            <a:ext cx="8862897" cy="2667000"/>
+          </a:xfrm>
+          <a:prstGeom prst="rect">
+            <a:avLst/>
+          </a:prstGeom>
+          <a:noFill/>
+          <a:ln>
+            <a:noFill/>
+          </a:ln>
+          <a:effectLst/>
+          <a:extLst>
+            <a:ext uri="{909E8E84-426E-40DD-AFC4-6F175D3DCCD1}">
+              <a14:hiddenFill xmlns:a14="http://schemas.microsoft.com/office/drawing/2010/main">
+                <a:solidFill>
+                  <a:schemeClr val="accent1"/>
+                </a:solidFill>
+              </a14:hiddenFill>
+            </a:ext>
+            <a:ext uri="{91240B29-F687-4F45-9708-019B960494DF}">
+              <a14:hiddenLine xmlns:a14="http://schemas.microsoft.com/office/drawing/2010/main" w="9525">
+                <a:solidFill>
+                  <a:schemeClr val="tx1"/>
+                </a:solidFill>
+                <a:miter lim="800000"/>
+                <a:headEnd/>
+                <a:tailEnd/>
+              </a14:hiddenLine>
+            </a:ext>
+            <a:ext uri="{AF507438-7753-43E0-B8FC-AC1667EBCBE1}">
+              <a14:hiddenEffects xmlns:a14="http://schemas.microsoft.com/office/drawing/2010/main">
+                <a:effectLst>
+                  <a:outerShdw dist="35921" dir="2700000" algn="ctr" rotWithShape="0">
+                    <a:schemeClr val="bg2"/>
+                  </a:outerShdw>
+                </a:effectLst>
+              </a14:hiddenEffects>
+            </a:ext>
+          </a:extLst>
+        </p:spPr>
+      </p:pic>
+    </p:spTree>
+    <p:custDataLst>
+      <p:tags r:id="rId1"/>
+    </p:custDataLst>
+    <p:extLst>
+      <p:ext uri="{BB962C8B-B14F-4D97-AF65-F5344CB8AC3E}">
+        <p14:creationId xmlns:p14="http://schemas.microsoft.com/office/powerpoint/2010/main" val="3727340800"/>
+      </p:ext>
+    </p:extLst>
+  </p:cSld>
+  <p:clrMapOvr>
+    <a:masterClrMapping/>
+  </p:clrMapOvr>
+  <p:timing>
+    <p:tnLst>
+      <p:par>
+        <p:cTn id="1" dur="indefinite" restart="never" nodeType="tmRoot"/>
+      </p:par>
+    </p:tnLst>
+  </p:timing>
+</p:sld>
+</file>
+
+<file path=ppt/slides/slide8.xml><?xml version="1.0" encoding="utf-8"?>
+<p:sld xmlns:a="http://schemas.openxmlformats.org/drawingml/2006/main" xmlns:r="http://schemas.openxmlformats.org/officeDocument/2006/relationships" xmlns:p="http://schemas.openxmlformats.org/presentationml/2006/main">
+  <p:cSld>
+    <p:spTree>
+      <p:nvGrpSpPr>
+        <p:cNvPr id="1" name=""/>
+        <p:cNvGrpSpPr/>
+        <p:nvPr/>
+      </p:nvGrpSpPr>
+      <p:grpSpPr>
+        <a:xfrm>
+          <a:off x="0" y="0"/>
+          <a:ext cx="0" cy="0"/>
+          <a:chOff x="0" y="0"/>
+          <a:chExt cx="0" cy="0"/>
+        </a:xfrm>
+      </p:grpSpPr>
+      <p:pic>
+        <p:nvPicPr>
+          <p:cNvPr id="6146" name="Picture 2"/>
+          <p:cNvPicPr>
+            <a:picLocks noChangeAspect="1" noChangeArrowheads="1"/>
+          </p:cNvPicPr>
+          <p:nvPr>
+            <p:custDataLst>
+              <p:tags r:id="rId2"/>
+            </p:custDataLst>
+          </p:nvPr>
+        </p:nvPicPr>
+        <p:blipFill>
+          <a:blip r:embed="rId5">
+            <a:extLst>
+              <a:ext uri="{28A0092B-C50C-407E-A947-70E740481C1C}">
+                <a14:useLocalDpi xmlns:a14="http://schemas.microsoft.com/office/drawing/2010/main" val="0"/>
+              </a:ext>
+            </a:extLst>
+          </a:blip>
+          <a:srcRect/>
+          <a:stretch>
+            <a:fillRect/>
+          </a:stretch>
+        </p:blipFill>
+        <p:spPr bwMode="auto">
+          <a:xfrm>
+            <a:off x="1295400" y="1905000"/>
+            <a:ext cx="6759677" cy="3048000"/>
+          </a:xfrm>
+          <a:prstGeom prst="rect">
+            <a:avLst/>
+          </a:prstGeom>
+          <a:noFill/>
+          <a:ln>
+            <a:noFill/>
+          </a:ln>
+          <a:effectLst/>
+          <a:extLst>
+            <a:ext uri="{909E8E84-426E-40DD-AFC4-6F175D3DCCD1}">
+              <a14:hiddenFill xmlns:a14="http://schemas.microsoft.com/office/drawing/2010/main">
+                <a:solidFill>
+                  <a:schemeClr val="accent1"/>
+                </a:solidFill>
+              </a14:hiddenFill>
+            </a:ext>
+            <a:ext uri="{91240B29-F687-4F45-9708-019B960494DF}">
+              <a14:hiddenLine xmlns:a14="http://schemas.microsoft.com/office/drawing/2010/main" w="9525">
+                <a:solidFill>
+                  <a:schemeClr val="tx1"/>
+                </a:solidFill>
+                <a:miter lim="800000"/>
+                <a:headEnd/>
+                <a:tailEnd/>
+              </a14:hiddenLine>
+            </a:ext>
+            <a:ext uri="{AF507438-7753-43E0-B8FC-AC1667EBCBE1}">
+              <a14:hiddenEffects xmlns:a14="http://schemas.microsoft.com/office/drawing/2010/main">
+                <a:effectLst>
+                  <a:outerShdw dist="35921" dir="2700000" algn="ctr" rotWithShape="0">
+                    <a:schemeClr val="bg2"/>
+                  </a:outerShdw>
+                </a:effectLst>
+              </a14:hiddenEffects>
+            </a:ext>
+          </a:extLst>
+        </p:spPr>
+      </p:pic>
+    </p:spTree>
+    <p:custDataLst>
+      <p:tags r:id="rId1"/>
+    </p:custDataLst>
+    <p:extLst>
+      <p:ext uri="{BB962C8B-B14F-4D97-AF65-F5344CB8AC3E}">
+        <p14:creationId xmlns:p14="http://schemas.microsoft.com/office/powerpoint/2010/main" val="2224897939"/>
+      </p:ext>
+    </p:extLst>
+  </p:cSld>
+  <p:clrMapOvr>
+    <a:masterClrMapping/>
+  </p:clrMapOvr>
+  <p:timing>
+    <p:tnLst>
+      <p:par>
+        <p:cTn id="1" dur="indefinite" restart="never" nodeType="tmRoot"/>
+      </p:par>
+    </p:tnLst>
+  </p:timing>
+</p:sld>
+</file>
+
+<file path=ppt/slides/slide9.xml><?xml version="1.0" encoding="utf-8"?>
 <p:sld xmlns:a="http://schemas.openxmlformats.org/drawingml/2006/main" xmlns:r="http://schemas.openxmlformats.org/officeDocument/2006/relationships" xmlns:p="http://schemas.openxmlformats.org/presentationml/2006/main">
   <p:cSld>
     <p:spTree>
@@ -3679,10 +5419,14 @@
           <p:cNvPicPr>
             <a:picLocks noChangeAspect="1" noChangeArrowheads="1"/>
           </p:cNvPicPr>
-          <p:nvPr/>
+          <p:nvPr>
+            <p:custDataLst>
+              <p:tags r:id="rId2"/>
+            </p:custDataLst>
+          </p:nvPr>
         </p:nvPicPr>
         <p:blipFill>
-          <a:blip r:embed="rId3">
+          <a:blip r:embed="rId5">
             <a:extLst>
               <a:ext uri="{28A0092B-C50C-407E-A947-70E740481C1C}">
                 <a14:useLocalDpi xmlns:a14="http://schemas.microsoft.com/office/drawing/2010/main" val="0"/>
@@ -3738,6 +5482,9 @@
         </p:spPr>
       </p:pic>
     </p:spTree>
+    <p:custDataLst>
+      <p:tags r:id="rId1"/>
+    </p:custDataLst>
     <p:extLst>
       <p:ext uri="{BB962C8B-B14F-4D97-AF65-F5344CB8AC3E}">
         <p14:creationId xmlns:p14="http://schemas.microsoft.com/office/powerpoint/2010/main" val="16975627"/>
@@ -3757,1664 +5504,412 @@
 </p:sld>
 </file>
 
-<file path=ppt/slides/slide11.xml><?xml version="1.0" encoding="utf-8"?>
-<p:sld xmlns:a="http://schemas.openxmlformats.org/drawingml/2006/main" xmlns:r="http://schemas.openxmlformats.org/officeDocument/2006/relationships" xmlns:p="http://schemas.openxmlformats.org/presentationml/2006/main">
-  <p:cSld>
-    <p:spTree>
-      <p:nvGrpSpPr>
-        <p:cNvPr id="1" name=""/>
-        <p:cNvGrpSpPr/>
-        <p:nvPr/>
-      </p:nvGrpSpPr>
-      <p:grpSpPr>
-        <a:xfrm>
-          <a:off x="0" y="0"/>
-          <a:ext cx="0" cy="0"/>
-          <a:chOff x="0" y="0"/>
-          <a:chExt cx="0" cy="0"/>
-        </a:xfrm>
-      </p:grpSpPr>
-      <p:sp>
-        <p:nvSpPr>
-          <p:cNvPr id="3" name="Text Placeholder 2"/>
-          <p:cNvSpPr>
-            <a:spLocks noGrp="1"/>
-          </p:cNvSpPr>
-          <p:nvPr>
-            <p:ph type="body" idx="1"/>
-          </p:nvPr>
-        </p:nvSpPr>
-        <p:spPr>
-          <a:xfrm>
-            <a:off x="762000" y="2767013"/>
-            <a:ext cx="7772400" cy="1500187"/>
-          </a:xfrm>
-        </p:spPr>
-        <p:txBody>
-          <a:bodyPr>
-            <a:noAutofit/>
-          </a:bodyPr>
-          <a:lstStyle/>
-          <a:p>
-            <a:r>
-              <a:rPr lang="en-US" sz="5400" dirty="0" smtClean="0"/>
-              <a:t>Where’s the behavior?</a:t>
-            </a:r>
-            <a:endParaRPr lang="en-US" sz="5400" dirty="0"/>
-          </a:p>
-        </p:txBody>
-      </p:sp>
-    </p:spTree>
-    <p:extLst>
-      <p:ext uri="{BB962C8B-B14F-4D97-AF65-F5344CB8AC3E}">
-        <p14:creationId xmlns:p14="http://schemas.microsoft.com/office/powerpoint/2010/main" val="21984998"/>
-      </p:ext>
-    </p:extLst>
-  </p:cSld>
-  <p:clrMapOvr>
-    <a:masterClrMapping/>
-  </p:clrMapOvr>
-  <p:timing>
-    <p:tnLst>
-      <p:par>
-        <p:cTn id="1" dur="indefinite" restart="never" nodeType="tmRoot"/>
-      </p:par>
-    </p:tnLst>
-  </p:timing>
-</p:sld>
-</file>
-
-<file path=ppt/slides/slide12.xml><?xml version="1.0" encoding="utf-8"?>
-<p:sld xmlns:a="http://schemas.openxmlformats.org/drawingml/2006/main" xmlns:r="http://schemas.openxmlformats.org/officeDocument/2006/relationships" xmlns:p="http://schemas.openxmlformats.org/presentationml/2006/main">
-  <p:cSld>
-    <p:spTree>
-      <p:nvGrpSpPr>
-        <p:cNvPr id="1" name=""/>
-        <p:cNvGrpSpPr/>
-        <p:nvPr/>
-      </p:nvGrpSpPr>
-      <p:grpSpPr>
-        <a:xfrm>
-          <a:off x="0" y="0"/>
-          <a:ext cx="0" cy="0"/>
-          <a:chOff x="0" y="0"/>
-          <a:chExt cx="0" cy="0"/>
-        </a:xfrm>
-      </p:grpSpPr>
-      <p:pic>
-        <p:nvPicPr>
-          <p:cNvPr id="2050" name="Picture 2"/>
-          <p:cNvPicPr>
-            <a:picLocks noChangeAspect="1" noChangeArrowheads="1"/>
-          </p:cNvPicPr>
-          <p:nvPr/>
-        </p:nvPicPr>
-        <p:blipFill>
-          <a:blip r:embed="rId3">
-            <a:extLst>
-              <a:ext uri="{28A0092B-C50C-407E-A947-70E740481C1C}">
-                <a14:useLocalDpi xmlns:a14="http://schemas.microsoft.com/office/drawing/2010/main" val="0"/>
-              </a:ext>
-            </a:extLst>
-          </a:blip>
-          <a:srcRect/>
-          <a:stretch>
-            <a:fillRect/>
-          </a:stretch>
-        </p:blipFill>
-        <p:spPr bwMode="auto">
-          <a:xfrm>
-            <a:off x="838200" y="1115290"/>
-            <a:ext cx="7162800" cy="5027735"/>
-          </a:xfrm>
-          <a:prstGeom prst="rect">
-            <a:avLst/>
-          </a:prstGeom>
-          <a:noFill/>
-          <a:ln>
-            <a:noFill/>
-          </a:ln>
-          <a:effectLst/>
-          <a:extLst>
-            <a:ext uri="{909E8E84-426E-40DD-AFC4-6F175D3DCCD1}">
-              <a14:hiddenFill xmlns:a14="http://schemas.microsoft.com/office/drawing/2010/main">
-                <a:solidFill>
-                  <a:schemeClr val="accent1"/>
-                </a:solidFill>
-              </a14:hiddenFill>
-            </a:ext>
-            <a:ext uri="{91240B29-F687-4F45-9708-019B960494DF}">
-              <a14:hiddenLine xmlns:a14="http://schemas.microsoft.com/office/drawing/2010/main" w="9525">
-                <a:solidFill>
-                  <a:schemeClr val="tx1"/>
-                </a:solidFill>
-                <a:miter lim="800000"/>
-                <a:headEnd/>
-                <a:tailEnd/>
-              </a14:hiddenLine>
-            </a:ext>
-            <a:ext uri="{AF507438-7753-43E0-B8FC-AC1667EBCBE1}">
-              <a14:hiddenEffects xmlns:a14="http://schemas.microsoft.com/office/drawing/2010/main">
-                <a:effectLst>
-                  <a:outerShdw dist="35921" dir="2700000" algn="ctr" rotWithShape="0">
-                    <a:schemeClr val="bg2"/>
-                  </a:outerShdw>
-                </a:effectLst>
-              </a14:hiddenEffects>
-            </a:ext>
-          </a:extLst>
-        </p:spPr>
-      </p:pic>
-    </p:spTree>
-    <p:extLst>
-      <p:ext uri="{BB962C8B-B14F-4D97-AF65-F5344CB8AC3E}">
-        <p14:creationId xmlns:p14="http://schemas.microsoft.com/office/powerpoint/2010/main" val="2079946211"/>
-      </p:ext>
-    </p:extLst>
-  </p:cSld>
-  <p:clrMapOvr>
-    <a:masterClrMapping/>
-  </p:clrMapOvr>
-  <p:timing>
-    <p:tnLst>
-      <p:par>
-        <p:cTn id="1" dur="indefinite" restart="never" nodeType="tmRoot"/>
-      </p:par>
-    </p:tnLst>
-  </p:timing>
-</p:sld>
-</file>
-
-<file path=ppt/slides/slide13.xml><?xml version="1.0" encoding="utf-8"?>
-<p:sld xmlns:a="http://schemas.openxmlformats.org/drawingml/2006/main" xmlns:r="http://schemas.openxmlformats.org/officeDocument/2006/relationships" xmlns:p="http://schemas.openxmlformats.org/presentationml/2006/main">
-  <p:cSld>
-    <p:spTree>
-      <p:nvGrpSpPr>
-        <p:cNvPr id="1" name=""/>
-        <p:cNvGrpSpPr/>
-        <p:nvPr/>
-      </p:nvGrpSpPr>
-      <p:grpSpPr>
-        <a:xfrm>
-          <a:off x="0" y="0"/>
-          <a:ext cx="0" cy="0"/>
-          <a:chOff x="0" y="0"/>
-          <a:chExt cx="0" cy="0"/>
-        </a:xfrm>
-      </p:grpSpPr>
-      <p:sp>
-        <p:nvSpPr>
-          <p:cNvPr id="3" name="Text Placeholder 2"/>
-          <p:cNvSpPr>
-            <a:spLocks noGrp="1"/>
-          </p:cNvSpPr>
-          <p:nvPr>
-            <p:ph type="body" idx="1"/>
-          </p:nvPr>
-        </p:nvSpPr>
-        <p:spPr>
-          <a:xfrm>
-            <a:off x="762000" y="2767013"/>
-            <a:ext cx="7772400" cy="1500187"/>
-          </a:xfrm>
-        </p:spPr>
-        <p:txBody>
-          <a:bodyPr>
-            <a:noAutofit/>
-          </a:bodyPr>
-          <a:lstStyle/>
-          <a:p>
-            <a:r>
-              <a:rPr lang="en-US" sz="5400" dirty="0" smtClean="0"/>
-              <a:t>Anemic domain models</a:t>
-            </a:r>
-            <a:endParaRPr lang="en-US" sz="5400" dirty="0"/>
-          </a:p>
-        </p:txBody>
-      </p:sp>
-    </p:spTree>
-    <p:extLst>
-      <p:ext uri="{BB962C8B-B14F-4D97-AF65-F5344CB8AC3E}">
-        <p14:creationId xmlns:p14="http://schemas.microsoft.com/office/powerpoint/2010/main" val="1711875874"/>
-      </p:ext>
-    </p:extLst>
-  </p:cSld>
-  <p:clrMapOvr>
-    <a:masterClrMapping/>
-  </p:clrMapOvr>
-  <p:timing>
-    <p:tnLst>
-      <p:par>
-        <p:cTn id="1" dur="indefinite" restart="never" nodeType="tmRoot"/>
-      </p:par>
-    </p:tnLst>
-  </p:timing>
-</p:sld>
-</file>
-
-<file path=ppt/slides/slide14.xml><?xml version="1.0" encoding="utf-8"?>
-<p:sld xmlns:a="http://schemas.openxmlformats.org/drawingml/2006/main" xmlns:r="http://schemas.openxmlformats.org/officeDocument/2006/relationships" xmlns:p="http://schemas.openxmlformats.org/presentationml/2006/main">
-  <p:cSld>
-    <p:spTree>
-      <p:nvGrpSpPr>
-        <p:cNvPr id="1" name=""/>
-        <p:cNvGrpSpPr/>
-        <p:nvPr/>
-      </p:nvGrpSpPr>
-      <p:grpSpPr>
-        <a:xfrm>
-          <a:off x="0" y="0"/>
-          <a:ext cx="0" cy="0"/>
-          <a:chOff x="0" y="0"/>
-          <a:chExt cx="0" cy="0"/>
-        </a:xfrm>
-      </p:grpSpPr>
-      <p:sp>
-        <p:nvSpPr>
-          <p:cNvPr id="3" name="Text Placeholder 2"/>
-          <p:cNvSpPr>
-            <a:spLocks noGrp="1"/>
-          </p:cNvSpPr>
-          <p:nvPr>
-            <p:ph type="body" idx="1"/>
-          </p:nvPr>
-        </p:nvSpPr>
-        <p:spPr>
-          <a:xfrm>
-            <a:off x="762000" y="2767013"/>
-            <a:ext cx="7772400" cy="1500187"/>
-          </a:xfrm>
-        </p:spPr>
-        <p:txBody>
-          <a:bodyPr>
-            <a:noAutofit/>
-          </a:bodyPr>
-          <a:lstStyle/>
-          <a:p>
-            <a:r>
-              <a:rPr lang="en-US" dirty="0" smtClean="0"/>
-              <a:t>Offer Assignment Service</a:t>
-            </a:r>
-            <a:endParaRPr lang="en-US" dirty="0"/>
-          </a:p>
-        </p:txBody>
-      </p:sp>
-    </p:spTree>
-    <p:extLst>
-      <p:ext uri="{BB962C8B-B14F-4D97-AF65-F5344CB8AC3E}">
-        <p14:creationId xmlns:p14="http://schemas.microsoft.com/office/powerpoint/2010/main" val="1861451711"/>
-      </p:ext>
-    </p:extLst>
-  </p:cSld>
-  <p:clrMapOvr>
-    <a:masterClrMapping/>
-  </p:clrMapOvr>
-  <p:timing>
-    <p:tnLst>
-      <p:par>
-        <p:cTn id="1" dur="indefinite" restart="never" nodeType="tmRoot"/>
-      </p:par>
-    </p:tnLst>
-  </p:timing>
-</p:sld>
-</file>
-
-<file path=ppt/slides/slide15.xml><?xml version="1.0" encoding="utf-8"?>
-<p:sld xmlns:a="http://schemas.openxmlformats.org/drawingml/2006/main" xmlns:r="http://schemas.openxmlformats.org/officeDocument/2006/relationships" xmlns:p="http://schemas.openxmlformats.org/presentationml/2006/main">
-  <p:cSld>
-    <p:spTree>
-      <p:nvGrpSpPr>
-        <p:cNvPr id="1" name=""/>
-        <p:cNvGrpSpPr/>
-        <p:nvPr/>
-      </p:nvGrpSpPr>
-      <p:grpSpPr>
-        <a:xfrm>
-          <a:off x="0" y="0"/>
-          <a:ext cx="0" cy="0"/>
-          <a:chOff x="0" y="0"/>
-          <a:chExt cx="0" cy="0"/>
-        </a:xfrm>
-      </p:grpSpPr>
-      <p:sp>
-        <p:nvSpPr>
-          <p:cNvPr id="2" name="Title 1"/>
-          <p:cNvSpPr>
-            <a:spLocks noGrp="1"/>
-          </p:cNvSpPr>
-          <p:nvPr>
-            <p:ph type="title"/>
-          </p:nvPr>
-        </p:nvSpPr>
-        <p:spPr/>
-        <p:txBody>
-          <a:bodyPr/>
-          <a:lstStyle/>
-          <a:p>
-            <a:endParaRPr lang="en-US"/>
-          </a:p>
-        </p:txBody>
-      </p:sp>
-      <p:pic>
-        <p:nvPicPr>
-          <p:cNvPr id="7170" name="Picture 2"/>
-          <p:cNvPicPr>
-            <a:picLocks noChangeAspect="1" noChangeArrowheads="1"/>
-          </p:cNvPicPr>
-          <p:nvPr/>
-        </p:nvPicPr>
-        <p:blipFill>
-          <a:blip r:embed="rId2">
-            <a:extLst>
-              <a:ext uri="{28A0092B-C50C-407E-A947-70E740481C1C}">
-                <a14:useLocalDpi xmlns:a14="http://schemas.microsoft.com/office/drawing/2010/main" val="0"/>
-              </a:ext>
-            </a:extLst>
-          </a:blip>
-          <a:srcRect/>
-          <a:stretch>
-            <a:fillRect/>
-          </a:stretch>
-        </p:blipFill>
-        <p:spPr bwMode="auto">
-          <a:xfrm>
-            <a:off x="381000" y="1000125"/>
-            <a:ext cx="8001000" cy="5434642"/>
-          </a:xfrm>
-          <a:prstGeom prst="rect">
-            <a:avLst/>
-          </a:prstGeom>
-          <a:noFill/>
-          <a:ln>
-            <a:noFill/>
-          </a:ln>
-          <a:effectLst/>
-          <a:extLst>
-            <a:ext uri="{909E8E84-426E-40DD-AFC4-6F175D3DCCD1}">
-              <a14:hiddenFill xmlns:a14="http://schemas.microsoft.com/office/drawing/2010/main">
-                <a:solidFill>
-                  <a:schemeClr val="accent1"/>
-                </a:solidFill>
-              </a14:hiddenFill>
-            </a:ext>
-            <a:ext uri="{91240B29-F687-4F45-9708-019B960494DF}">
-              <a14:hiddenLine xmlns:a14="http://schemas.microsoft.com/office/drawing/2010/main" w="9525">
-                <a:solidFill>
-                  <a:schemeClr val="tx1"/>
-                </a:solidFill>
-                <a:miter lim="800000"/>
-                <a:headEnd/>
-                <a:tailEnd/>
-              </a14:hiddenLine>
-            </a:ext>
-            <a:ext uri="{AF507438-7753-43E0-B8FC-AC1667EBCBE1}">
-              <a14:hiddenEffects xmlns:a14="http://schemas.microsoft.com/office/drawing/2010/main">
-                <a:effectLst>
-                  <a:outerShdw dist="35921" dir="2700000" algn="ctr" rotWithShape="0">
-                    <a:schemeClr val="bg2"/>
-                  </a:outerShdw>
-                </a:effectLst>
-              </a14:hiddenEffects>
-            </a:ext>
-          </a:extLst>
-        </p:spPr>
-      </p:pic>
-    </p:spTree>
-    <p:extLst>
-      <p:ext uri="{BB962C8B-B14F-4D97-AF65-F5344CB8AC3E}">
-        <p14:creationId xmlns:p14="http://schemas.microsoft.com/office/powerpoint/2010/main" val="1360281514"/>
-      </p:ext>
-    </p:extLst>
-  </p:cSld>
-  <p:clrMapOvr>
-    <a:masterClrMapping/>
-  </p:clrMapOvr>
-  <p:timing>
-    <p:tnLst>
-      <p:par>
-        <p:cTn id="1" dur="indefinite" restart="never" nodeType="tmRoot"/>
-      </p:par>
-    </p:tnLst>
-  </p:timing>
-</p:sld>
-</file>
-
-<file path=ppt/slides/slide16.xml><?xml version="1.0" encoding="utf-8"?>
-<p:sld xmlns:a="http://schemas.openxmlformats.org/drawingml/2006/main" xmlns:r="http://schemas.openxmlformats.org/officeDocument/2006/relationships" xmlns:p="http://schemas.openxmlformats.org/presentationml/2006/main">
-  <p:cSld>
-    <p:spTree>
-      <p:nvGrpSpPr>
-        <p:cNvPr id="1" name=""/>
-        <p:cNvGrpSpPr/>
-        <p:nvPr/>
-      </p:nvGrpSpPr>
-      <p:grpSpPr>
-        <a:xfrm>
-          <a:off x="0" y="0"/>
-          <a:ext cx="0" cy="0"/>
-          <a:chOff x="0" y="0"/>
-          <a:chExt cx="0" cy="0"/>
-        </a:xfrm>
-      </p:grpSpPr>
-      <p:sp>
-        <p:nvSpPr>
-          <p:cNvPr id="2" name="Title 1"/>
-          <p:cNvSpPr>
-            <a:spLocks noGrp="1"/>
-          </p:cNvSpPr>
-          <p:nvPr>
-            <p:ph type="title"/>
-          </p:nvPr>
-        </p:nvSpPr>
-        <p:spPr/>
-        <p:txBody>
-          <a:bodyPr/>
-          <a:lstStyle/>
-          <a:p>
-            <a:endParaRPr lang="en-US"/>
-          </a:p>
-        </p:txBody>
-      </p:sp>
-      <p:pic>
-        <p:nvPicPr>
-          <p:cNvPr id="8194" name="Picture 2"/>
-          <p:cNvPicPr>
-            <a:picLocks noChangeAspect="1" noChangeArrowheads="1"/>
-          </p:cNvPicPr>
-          <p:nvPr/>
-        </p:nvPicPr>
-        <p:blipFill>
-          <a:blip r:embed="rId2">
-            <a:extLst>
-              <a:ext uri="{28A0092B-C50C-407E-A947-70E740481C1C}">
-                <a14:useLocalDpi xmlns:a14="http://schemas.microsoft.com/office/drawing/2010/main" val="0"/>
-              </a:ext>
-            </a:extLst>
-          </a:blip>
-          <a:srcRect/>
-          <a:stretch>
-            <a:fillRect/>
-          </a:stretch>
-        </p:blipFill>
-        <p:spPr bwMode="auto">
-          <a:xfrm>
-            <a:off x="76200" y="2438400"/>
-            <a:ext cx="8892988" cy="2362200"/>
-          </a:xfrm>
-          <a:prstGeom prst="rect">
-            <a:avLst/>
-          </a:prstGeom>
-          <a:noFill/>
-          <a:ln>
-            <a:noFill/>
-          </a:ln>
-          <a:effectLst/>
-          <a:extLst>
-            <a:ext uri="{909E8E84-426E-40DD-AFC4-6F175D3DCCD1}">
-              <a14:hiddenFill xmlns:a14="http://schemas.microsoft.com/office/drawing/2010/main">
-                <a:solidFill>
-                  <a:schemeClr val="accent1"/>
-                </a:solidFill>
-              </a14:hiddenFill>
-            </a:ext>
-            <a:ext uri="{91240B29-F687-4F45-9708-019B960494DF}">
-              <a14:hiddenLine xmlns:a14="http://schemas.microsoft.com/office/drawing/2010/main" w="9525">
-                <a:solidFill>
-                  <a:schemeClr val="tx1"/>
-                </a:solidFill>
-                <a:miter lim="800000"/>
-                <a:headEnd/>
-                <a:tailEnd/>
-              </a14:hiddenLine>
-            </a:ext>
-            <a:ext uri="{AF507438-7753-43E0-B8FC-AC1667EBCBE1}">
-              <a14:hiddenEffects xmlns:a14="http://schemas.microsoft.com/office/drawing/2010/main">
-                <a:effectLst>
-                  <a:outerShdw dist="35921" dir="2700000" algn="ctr" rotWithShape="0">
-                    <a:schemeClr val="bg2"/>
-                  </a:outerShdw>
-                </a:effectLst>
-              </a14:hiddenEffects>
-            </a:ext>
-          </a:extLst>
-        </p:spPr>
-      </p:pic>
-    </p:spTree>
-    <p:extLst>
-      <p:ext uri="{BB962C8B-B14F-4D97-AF65-F5344CB8AC3E}">
-        <p14:creationId xmlns:p14="http://schemas.microsoft.com/office/powerpoint/2010/main" val="4027872341"/>
-      </p:ext>
-    </p:extLst>
-  </p:cSld>
-  <p:clrMapOvr>
-    <a:masterClrMapping/>
-  </p:clrMapOvr>
-  <p:timing>
-    <p:tnLst>
-      <p:par>
-        <p:cTn id="1" dur="indefinite" restart="never" nodeType="tmRoot"/>
-      </p:par>
-    </p:tnLst>
-  </p:timing>
-</p:sld>
-</file>
-
-<file path=ppt/slides/slide17.xml><?xml version="1.0" encoding="utf-8"?>
-<p:sld xmlns:a="http://schemas.openxmlformats.org/drawingml/2006/main" xmlns:r="http://schemas.openxmlformats.org/officeDocument/2006/relationships" xmlns:p="http://schemas.openxmlformats.org/presentationml/2006/main">
-  <p:cSld>
-    <p:spTree>
-      <p:nvGrpSpPr>
-        <p:cNvPr id="1" name=""/>
-        <p:cNvGrpSpPr/>
-        <p:nvPr/>
-      </p:nvGrpSpPr>
-      <p:grpSpPr>
-        <a:xfrm>
-          <a:off x="0" y="0"/>
-          <a:ext cx="0" cy="0"/>
-          <a:chOff x="0" y="0"/>
-          <a:chExt cx="0" cy="0"/>
-        </a:xfrm>
-      </p:grpSpPr>
-      <p:sp>
-        <p:nvSpPr>
-          <p:cNvPr id="2" name="Title 1"/>
-          <p:cNvSpPr>
-            <a:spLocks noGrp="1"/>
-          </p:cNvSpPr>
-          <p:nvPr>
-            <p:ph type="title"/>
-          </p:nvPr>
-        </p:nvSpPr>
-        <p:spPr/>
-        <p:txBody>
-          <a:bodyPr/>
-          <a:lstStyle/>
-          <a:p>
-            <a:endParaRPr lang="en-US"/>
-          </a:p>
-        </p:txBody>
-      </p:sp>
-      <p:sp>
-        <p:nvSpPr>
-          <p:cNvPr id="3" name="Text Placeholder 2"/>
-          <p:cNvSpPr>
-            <a:spLocks noGrp="1"/>
-          </p:cNvSpPr>
-          <p:nvPr>
-            <p:ph type="body" idx="1"/>
-          </p:nvPr>
-        </p:nvSpPr>
-        <p:spPr/>
-        <p:txBody>
-          <a:bodyPr/>
-          <a:lstStyle/>
-          <a:p>
-            <a:endParaRPr lang="en-US"/>
-          </a:p>
-        </p:txBody>
-      </p:sp>
-      <p:pic>
-        <p:nvPicPr>
-          <p:cNvPr id="9218" name="Picture 2"/>
-          <p:cNvPicPr>
-            <a:picLocks noChangeAspect="1" noChangeArrowheads="1"/>
-          </p:cNvPicPr>
-          <p:nvPr/>
-        </p:nvPicPr>
-        <p:blipFill>
-          <a:blip r:embed="rId2">
-            <a:extLst>
-              <a:ext uri="{28A0092B-C50C-407E-A947-70E740481C1C}">
-                <a14:useLocalDpi xmlns:a14="http://schemas.microsoft.com/office/drawing/2010/main" val="0"/>
-              </a:ext>
-            </a:extLst>
-          </a:blip>
-          <a:srcRect/>
-          <a:stretch>
-            <a:fillRect/>
-          </a:stretch>
-        </p:blipFill>
-        <p:spPr bwMode="auto">
-          <a:xfrm>
-            <a:off x="228600" y="1219200"/>
-            <a:ext cx="8780501" cy="4953000"/>
-          </a:xfrm>
-          <a:prstGeom prst="rect">
-            <a:avLst/>
-          </a:prstGeom>
-          <a:noFill/>
-          <a:ln>
-            <a:noFill/>
-          </a:ln>
-          <a:effectLst/>
-          <a:extLst>
-            <a:ext uri="{909E8E84-426E-40DD-AFC4-6F175D3DCCD1}">
-              <a14:hiddenFill xmlns:a14="http://schemas.microsoft.com/office/drawing/2010/main">
-                <a:solidFill>
-                  <a:schemeClr val="accent1"/>
-                </a:solidFill>
-              </a14:hiddenFill>
-            </a:ext>
-            <a:ext uri="{91240B29-F687-4F45-9708-019B960494DF}">
-              <a14:hiddenLine xmlns:a14="http://schemas.microsoft.com/office/drawing/2010/main" w="9525">
-                <a:solidFill>
-                  <a:schemeClr val="tx1"/>
-                </a:solidFill>
-                <a:miter lim="800000"/>
-                <a:headEnd/>
-                <a:tailEnd/>
-              </a14:hiddenLine>
-            </a:ext>
-            <a:ext uri="{AF507438-7753-43E0-B8FC-AC1667EBCBE1}">
-              <a14:hiddenEffects xmlns:a14="http://schemas.microsoft.com/office/drawing/2010/main">
-                <a:effectLst>
-                  <a:outerShdw dist="35921" dir="2700000" algn="ctr" rotWithShape="0">
-                    <a:schemeClr val="bg2"/>
-                  </a:outerShdw>
-                </a:effectLst>
-              </a14:hiddenEffects>
-            </a:ext>
-          </a:extLst>
-        </p:spPr>
-      </p:pic>
-    </p:spTree>
-    <p:extLst>
-      <p:ext uri="{BB962C8B-B14F-4D97-AF65-F5344CB8AC3E}">
-        <p14:creationId xmlns:p14="http://schemas.microsoft.com/office/powerpoint/2010/main" val="3562491923"/>
-      </p:ext>
-    </p:extLst>
-  </p:cSld>
-  <p:clrMapOvr>
-    <a:masterClrMapping/>
-  </p:clrMapOvr>
-  <p:timing>
-    <p:tnLst>
-      <p:par>
-        <p:cTn id="1" dur="indefinite" restart="never" nodeType="tmRoot"/>
-      </p:par>
-    </p:tnLst>
-  </p:timing>
-</p:sld>
-</file>
-
-<file path=ppt/slides/slide18.xml><?xml version="1.0" encoding="utf-8"?>
-<p:sld xmlns:a="http://schemas.openxmlformats.org/drawingml/2006/main" xmlns:r="http://schemas.openxmlformats.org/officeDocument/2006/relationships" xmlns:p="http://schemas.openxmlformats.org/presentationml/2006/main">
-  <p:cSld>
-    <p:spTree>
-      <p:nvGrpSpPr>
-        <p:cNvPr id="1" name=""/>
-        <p:cNvGrpSpPr/>
-        <p:nvPr/>
-      </p:nvGrpSpPr>
-      <p:grpSpPr>
-        <a:xfrm>
-          <a:off x="0" y="0"/>
-          <a:ext cx="0" cy="0"/>
-          <a:chOff x="0" y="0"/>
-          <a:chExt cx="0" cy="0"/>
-        </a:xfrm>
-      </p:grpSpPr>
-      <p:sp>
-        <p:nvSpPr>
-          <p:cNvPr id="2" name="Title 1"/>
-          <p:cNvSpPr>
-            <a:spLocks noGrp="1"/>
-          </p:cNvSpPr>
-          <p:nvPr>
-            <p:ph type="title"/>
-          </p:nvPr>
-        </p:nvSpPr>
-        <p:spPr/>
-        <p:txBody>
-          <a:bodyPr/>
-          <a:lstStyle/>
-          <a:p>
-            <a:endParaRPr lang="en-US"/>
-          </a:p>
-        </p:txBody>
-      </p:sp>
-      <p:pic>
-        <p:nvPicPr>
-          <p:cNvPr id="10242" name="Picture 2"/>
-          <p:cNvPicPr>
-            <a:picLocks noChangeAspect="1" noChangeArrowheads="1"/>
-          </p:cNvPicPr>
-          <p:nvPr/>
-        </p:nvPicPr>
-        <p:blipFill>
-          <a:blip r:embed="rId2">
-            <a:extLst>
-              <a:ext uri="{28A0092B-C50C-407E-A947-70E740481C1C}">
-                <a14:useLocalDpi xmlns:a14="http://schemas.microsoft.com/office/drawing/2010/main" val="0"/>
-              </a:ext>
-            </a:extLst>
-          </a:blip>
-          <a:srcRect/>
-          <a:stretch>
-            <a:fillRect/>
-          </a:stretch>
-        </p:blipFill>
-        <p:spPr bwMode="auto">
-          <a:xfrm>
-            <a:off x="1066800" y="1144979"/>
-            <a:ext cx="6858000" cy="4926169"/>
-          </a:xfrm>
-          <a:prstGeom prst="rect">
-            <a:avLst/>
-          </a:prstGeom>
-          <a:noFill/>
-          <a:ln>
-            <a:noFill/>
-          </a:ln>
-          <a:effectLst/>
-          <a:extLst>
-            <a:ext uri="{909E8E84-426E-40DD-AFC4-6F175D3DCCD1}">
-              <a14:hiddenFill xmlns:a14="http://schemas.microsoft.com/office/drawing/2010/main">
-                <a:solidFill>
-                  <a:schemeClr val="accent1"/>
-                </a:solidFill>
-              </a14:hiddenFill>
-            </a:ext>
-            <a:ext uri="{91240B29-F687-4F45-9708-019B960494DF}">
-              <a14:hiddenLine xmlns:a14="http://schemas.microsoft.com/office/drawing/2010/main" w="9525">
-                <a:solidFill>
-                  <a:schemeClr val="tx1"/>
-                </a:solidFill>
-                <a:miter lim="800000"/>
-                <a:headEnd/>
-                <a:tailEnd/>
-              </a14:hiddenLine>
-            </a:ext>
-            <a:ext uri="{AF507438-7753-43E0-B8FC-AC1667EBCBE1}">
-              <a14:hiddenEffects xmlns:a14="http://schemas.microsoft.com/office/drawing/2010/main">
-                <a:effectLst>
-                  <a:outerShdw dist="35921" dir="2700000" algn="ctr" rotWithShape="0">
-                    <a:schemeClr val="bg2"/>
-                  </a:outerShdw>
-                </a:effectLst>
-              </a14:hiddenEffects>
-            </a:ext>
-          </a:extLst>
-        </p:spPr>
-      </p:pic>
-    </p:spTree>
-    <p:extLst>
-      <p:ext uri="{BB962C8B-B14F-4D97-AF65-F5344CB8AC3E}">
-        <p14:creationId xmlns:p14="http://schemas.microsoft.com/office/powerpoint/2010/main" val="3251861078"/>
-      </p:ext>
-    </p:extLst>
-  </p:cSld>
-  <p:clrMapOvr>
-    <a:masterClrMapping/>
-  </p:clrMapOvr>
-  <p:timing>
-    <p:tnLst>
-      <p:par>
-        <p:cTn id="1" dur="indefinite" restart="never" nodeType="tmRoot"/>
-      </p:par>
-    </p:tnLst>
-  </p:timing>
-</p:sld>
-</file>
-
-<file path=ppt/slides/slide19.xml><?xml version="1.0" encoding="utf-8"?>
-<p:sld xmlns:a="http://schemas.openxmlformats.org/drawingml/2006/main" xmlns:r="http://schemas.openxmlformats.org/officeDocument/2006/relationships" xmlns:p="http://schemas.openxmlformats.org/presentationml/2006/main">
-  <p:cSld>
-    <p:spTree>
-      <p:nvGrpSpPr>
-        <p:cNvPr id="1" name=""/>
-        <p:cNvGrpSpPr/>
-        <p:nvPr/>
-      </p:nvGrpSpPr>
-      <p:grpSpPr>
-        <a:xfrm>
-          <a:off x="0" y="0"/>
-          <a:ext cx="0" cy="0"/>
-          <a:chOff x="0" y="0"/>
-          <a:chExt cx="0" cy="0"/>
-        </a:xfrm>
-      </p:grpSpPr>
-      <p:sp>
-        <p:nvSpPr>
-          <p:cNvPr id="2" name="Title 1"/>
-          <p:cNvSpPr>
-            <a:spLocks noGrp="1"/>
-          </p:cNvSpPr>
-          <p:nvPr>
-            <p:ph type="title"/>
-          </p:nvPr>
-        </p:nvSpPr>
-        <p:spPr/>
-        <p:txBody>
-          <a:bodyPr/>
-          <a:lstStyle/>
-          <a:p>
-            <a:endParaRPr lang="en-US"/>
-          </a:p>
-        </p:txBody>
-      </p:sp>
-      <p:pic>
-        <p:nvPicPr>
-          <p:cNvPr id="11266" name="Picture 2"/>
-          <p:cNvPicPr>
-            <a:picLocks noChangeAspect="1" noChangeArrowheads="1"/>
-          </p:cNvPicPr>
-          <p:nvPr/>
-        </p:nvPicPr>
-        <p:blipFill>
-          <a:blip r:embed="rId2">
-            <a:extLst>
-              <a:ext uri="{28A0092B-C50C-407E-A947-70E740481C1C}">
-                <a14:useLocalDpi xmlns:a14="http://schemas.microsoft.com/office/drawing/2010/main" val="0"/>
-              </a:ext>
-            </a:extLst>
-          </a:blip>
-          <a:srcRect/>
-          <a:stretch>
-            <a:fillRect/>
-          </a:stretch>
-        </p:blipFill>
-        <p:spPr bwMode="auto">
-          <a:xfrm>
-            <a:off x="1066800" y="1143000"/>
-            <a:ext cx="6789270" cy="4876800"/>
-          </a:xfrm>
-          <a:prstGeom prst="rect">
-            <a:avLst/>
-          </a:prstGeom>
-          <a:noFill/>
-          <a:ln>
-            <a:noFill/>
-          </a:ln>
-          <a:effectLst/>
-          <a:extLst>
-            <a:ext uri="{909E8E84-426E-40DD-AFC4-6F175D3DCCD1}">
-              <a14:hiddenFill xmlns:a14="http://schemas.microsoft.com/office/drawing/2010/main">
-                <a:solidFill>
-                  <a:schemeClr val="accent1"/>
-                </a:solidFill>
-              </a14:hiddenFill>
-            </a:ext>
-            <a:ext uri="{91240B29-F687-4F45-9708-019B960494DF}">
-              <a14:hiddenLine xmlns:a14="http://schemas.microsoft.com/office/drawing/2010/main" w="9525">
-                <a:solidFill>
-                  <a:schemeClr val="tx1"/>
-                </a:solidFill>
-                <a:miter lim="800000"/>
-                <a:headEnd/>
-                <a:tailEnd/>
-              </a14:hiddenLine>
-            </a:ext>
-            <a:ext uri="{AF507438-7753-43E0-B8FC-AC1667EBCBE1}">
-              <a14:hiddenEffects xmlns:a14="http://schemas.microsoft.com/office/drawing/2010/main">
-                <a:effectLst>
-                  <a:outerShdw dist="35921" dir="2700000" algn="ctr" rotWithShape="0">
-                    <a:schemeClr val="bg2"/>
-                  </a:outerShdw>
-                </a:effectLst>
-              </a14:hiddenEffects>
-            </a:ext>
-          </a:extLst>
-        </p:spPr>
-      </p:pic>
-    </p:spTree>
-    <p:extLst>
-      <p:ext uri="{BB962C8B-B14F-4D97-AF65-F5344CB8AC3E}">
-        <p14:creationId xmlns:p14="http://schemas.microsoft.com/office/powerpoint/2010/main" val="2763436465"/>
-      </p:ext>
-    </p:extLst>
-  </p:cSld>
-  <p:clrMapOvr>
-    <a:masterClrMapping/>
-  </p:clrMapOvr>
-  <p:timing>
-    <p:tnLst>
-      <p:par>
-        <p:cTn id="1" dur="indefinite" restart="never" nodeType="tmRoot"/>
-      </p:par>
-    </p:tnLst>
-  </p:timing>
-</p:sld>
-</file>
-
-<file path=ppt/slides/slide2.xml><?xml version="1.0" encoding="utf-8"?>
-<p:sld xmlns:a="http://schemas.openxmlformats.org/drawingml/2006/main" xmlns:r="http://schemas.openxmlformats.org/officeDocument/2006/relationships" xmlns:p="http://schemas.openxmlformats.org/presentationml/2006/main">
-  <p:cSld>
-    <p:spTree>
-      <p:nvGrpSpPr>
-        <p:cNvPr id="1" name=""/>
-        <p:cNvGrpSpPr/>
-        <p:nvPr/>
-      </p:nvGrpSpPr>
-      <p:grpSpPr>
-        <a:xfrm>
-          <a:off x="0" y="0"/>
-          <a:ext cx="0" cy="0"/>
-          <a:chOff x="0" y="0"/>
-          <a:chExt cx="0" cy="0"/>
-        </a:xfrm>
-      </p:grpSpPr>
-      <p:sp>
-        <p:nvSpPr>
-          <p:cNvPr id="3" name="Text Placeholder 2"/>
-          <p:cNvSpPr>
-            <a:spLocks noGrp="1"/>
-          </p:cNvSpPr>
-          <p:nvPr>
-            <p:ph type="body" idx="1"/>
-          </p:nvPr>
-        </p:nvSpPr>
-        <p:spPr>
-          <a:xfrm>
-            <a:off x="762000" y="2767013"/>
-            <a:ext cx="7772400" cy="1500187"/>
-          </a:xfrm>
-        </p:spPr>
-        <p:txBody>
-          <a:bodyPr>
-            <a:noAutofit/>
-          </a:bodyPr>
-          <a:lstStyle/>
-          <a:p>
-            <a:r>
-              <a:rPr lang="en-US" dirty="0" smtClean="0"/>
-              <a:t>What is a domain model?</a:t>
-            </a:r>
-            <a:endParaRPr lang="en-US" dirty="0"/>
-          </a:p>
-        </p:txBody>
-      </p:sp>
-    </p:spTree>
-    <p:extLst>
-      <p:ext uri="{BB962C8B-B14F-4D97-AF65-F5344CB8AC3E}">
-        <p14:creationId xmlns:p14="http://schemas.microsoft.com/office/powerpoint/2010/main" val="2234195537"/>
-      </p:ext>
-    </p:extLst>
-  </p:cSld>
-  <p:clrMapOvr>
-    <a:masterClrMapping/>
-  </p:clrMapOvr>
-  <p:timing>
-    <p:tnLst>
-      <p:par>
-        <p:cTn id="1" dur="indefinite" restart="never" nodeType="tmRoot"/>
-      </p:par>
-    </p:tnLst>
-  </p:timing>
-</p:sld>
-</file>
-
-<file path=ppt/slides/slide20.xml><?xml version="1.0" encoding="utf-8"?>
-<p:sld xmlns:a="http://schemas.openxmlformats.org/drawingml/2006/main" xmlns:r="http://schemas.openxmlformats.org/officeDocument/2006/relationships" xmlns:p="http://schemas.openxmlformats.org/presentationml/2006/main">
-  <p:cSld>
-    <p:spTree>
-      <p:nvGrpSpPr>
-        <p:cNvPr id="1" name=""/>
-        <p:cNvGrpSpPr/>
-        <p:nvPr/>
-      </p:nvGrpSpPr>
-      <p:grpSpPr>
-        <a:xfrm>
-          <a:off x="0" y="0"/>
-          <a:ext cx="0" cy="0"/>
-          <a:chOff x="0" y="0"/>
-          <a:chExt cx="0" cy="0"/>
-        </a:xfrm>
-      </p:grpSpPr>
-      <p:sp>
-        <p:nvSpPr>
-          <p:cNvPr id="3" name="Text Placeholder 2"/>
-          <p:cNvSpPr>
-            <a:spLocks noGrp="1"/>
-          </p:cNvSpPr>
-          <p:nvPr>
-            <p:ph type="body" idx="1"/>
-          </p:nvPr>
-        </p:nvSpPr>
-        <p:spPr>
-          <a:xfrm>
-            <a:off x="762000" y="2767013"/>
-            <a:ext cx="7772400" cy="1500187"/>
-          </a:xfrm>
-        </p:spPr>
-        <p:txBody>
-          <a:bodyPr>
-            <a:noAutofit/>
-          </a:bodyPr>
-          <a:lstStyle/>
-          <a:p>
-            <a:r>
-              <a:rPr lang="en-US" sz="8800" dirty="0" smtClean="0"/>
-              <a:t>Solution</a:t>
-            </a:r>
-            <a:endParaRPr lang="en-US" sz="8800" dirty="0"/>
-          </a:p>
-        </p:txBody>
-      </p:sp>
-    </p:spTree>
-    <p:extLst>
-      <p:ext uri="{BB962C8B-B14F-4D97-AF65-F5344CB8AC3E}">
-        <p14:creationId xmlns:p14="http://schemas.microsoft.com/office/powerpoint/2010/main" val="3440422625"/>
-      </p:ext>
-    </p:extLst>
-  </p:cSld>
-  <p:clrMapOvr>
-    <a:masterClrMapping/>
-  </p:clrMapOvr>
-  <p:timing>
-    <p:tnLst>
-      <p:par>
-        <p:cTn id="1" dur="indefinite" restart="never" nodeType="tmRoot"/>
-      </p:par>
-    </p:tnLst>
-  </p:timing>
-</p:sld>
-</file>
-
-<file path=ppt/slides/slide3.xml><?xml version="1.0" encoding="utf-8"?>
-<p:sld xmlns:a="http://schemas.openxmlformats.org/drawingml/2006/main" xmlns:r="http://schemas.openxmlformats.org/officeDocument/2006/relationships" xmlns:p="http://schemas.openxmlformats.org/presentationml/2006/main">
-  <p:cSld>
-    <p:spTree>
-      <p:nvGrpSpPr>
-        <p:cNvPr id="1" name=""/>
-        <p:cNvGrpSpPr/>
-        <p:nvPr/>
-      </p:nvGrpSpPr>
-      <p:grpSpPr>
-        <a:xfrm>
-          <a:off x="0" y="0"/>
-          <a:ext cx="0" cy="0"/>
-          <a:chOff x="0" y="0"/>
-          <a:chExt cx="0" cy="0"/>
-        </a:xfrm>
-      </p:grpSpPr>
-      <p:sp>
-        <p:nvSpPr>
-          <p:cNvPr id="3" name="Text Placeholder 2"/>
-          <p:cNvSpPr>
-            <a:spLocks noGrp="1"/>
-          </p:cNvSpPr>
-          <p:nvPr>
-            <p:ph type="body" idx="1"/>
-          </p:nvPr>
-        </p:nvSpPr>
-        <p:spPr>
-          <a:xfrm>
-            <a:off x="762000" y="2767013"/>
-            <a:ext cx="7772400" cy="1500187"/>
-          </a:xfrm>
-        </p:spPr>
-        <p:txBody>
-          <a:bodyPr>
-            <a:noAutofit/>
-          </a:bodyPr>
-          <a:lstStyle/>
-          <a:p>
-            <a:r>
-              <a:rPr lang="en-US" sz="6000" dirty="0" smtClean="0"/>
-              <a:t>Why should I care?</a:t>
-            </a:r>
-            <a:endParaRPr lang="en-US" sz="6000" dirty="0"/>
-          </a:p>
-        </p:txBody>
-      </p:sp>
-    </p:spTree>
-    <p:extLst>
-      <p:ext uri="{BB962C8B-B14F-4D97-AF65-F5344CB8AC3E}">
-        <p14:creationId xmlns:p14="http://schemas.microsoft.com/office/powerpoint/2010/main" val="3584807295"/>
-      </p:ext>
-    </p:extLst>
-  </p:cSld>
-  <p:clrMapOvr>
-    <a:masterClrMapping/>
-  </p:clrMapOvr>
-  <p:timing>
-    <p:tnLst>
-      <p:par>
-        <p:cTn id="1" dur="indefinite" restart="never" nodeType="tmRoot"/>
-      </p:par>
-    </p:tnLst>
-  </p:timing>
-</p:sld>
-</file>
-
-<file path=ppt/slides/slide4.xml><?xml version="1.0" encoding="utf-8"?>
-<p:sld xmlns:a="http://schemas.openxmlformats.org/drawingml/2006/main" xmlns:r="http://schemas.openxmlformats.org/officeDocument/2006/relationships" xmlns:p="http://schemas.openxmlformats.org/presentationml/2006/main">
-  <p:cSld>
-    <p:spTree>
-      <p:nvGrpSpPr>
-        <p:cNvPr id="1" name=""/>
-        <p:cNvGrpSpPr/>
-        <p:nvPr/>
-      </p:nvGrpSpPr>
-      <p:grpSpPr>
-        <a:xfrm>
-          <a:off x="0" y="0"/>
-          <a:ext cx="0" cy="0"/>
-          <a:chOff x="0" y="0"/>
-          <a:chExt cx="0" cy="0"/>
-        </a:xfrm>
-      </p:grpSpPr>
-      <p:sp>
-        <p:nvSpPr>
-          <p:cNvPr id="3" name="Text Placeholder 2"/>
-          <p:cNvSpPr>
-            <a:spLocks noGrp="1"/>
-          </p:cNvSpPr>
-          <p:nvPr>
-            <p:ph type="body" idx="1"/>
-          </p:nvPr>
-        </p:nvSpPr>
-        <p:spPr>
-          <a:xfrm>
-            <a:off x="762000" y="2767013"/>
-            <a:ext cx="7772400" cy="1500187"/>
-          </a:xfrm>
-        </p:spPr>
-        <p:txBody>
-          <a:bodyPr>
-            <a:noAutofit/>
-          </a:bodyPr>
-          <a:lstStyle/>
-          <a:p>
-            <a:r>
-              <a:rPr lang="en-US" sz="8800" dirty="0" smtClean="0"/>
-              <a:t>Good news</a:t>
-            </a:r>
-            <a:endParaRPr lang="en-US" sz="8800" dirty="0"/>
-          </a:p>
-        </p:txBody>
-      </p:sp>
-    </p:spTree>
-    <p:extLst>
-      <p:ext uri="{BB962C8B-B14F-4D97-AF65-F5344CB8AC3E}">
-        <p14:creationId xmlns:p14="http://schemas.microsoft.com/office/powerpoint/2010/main" val="3364507888"/>
-      </p:ext>
-    </p:extLst>
-  </p:cSld>
-  <p:clrMapOvr>
-    <a:masterClrMapping/>
-  </p:clrMapOvr>
-  <p:timing>
-    <p:tnLst>
-      <p:par>
-        <p:cTn id="1" dur="indefinite" restart="never" nodeType="tmRoot"/>
-      </p:par>
-    </p:tnLst>
-  </p:timing>
-</p:sld>
-</file>
-
-<file path=ppt/slides/slide5.xml><?xml version="1.0" encoding="utf-8"?>
-<p:sld xmlns:a="http://schemas.openxmlformats.org/drawingml/2006/main" xmlns:r="http://schemas.openxmlformats.org/officeDocument/2006/relationships" xmlns:p="http://schemas.openxmlformats.org/presentationml/2006/main">
-  <p:cSld>
-    <p:spTree>
-      <p:nvGrpSpPr>
-        <p:cNvPr id="1" name=""/>
-        <p:cNvGrpSpPr/>
-        <p:nvPr/>
-      </p:nvGrpSpPr>
-      <p:grpSpPr>
-        <a:xfrm>
-          <a:off x="0" y="0"/>
-          <a:ext cx="0" cy="0"/>
-          <a:chOff x="0" y="0"/>
-          <a:chExt cx="0" cy="0"/>
-        </a:xfrm>
-      </p:grpSpPr>
-      <p:sp>
-        <p:nvSpPr>
-          <p:cNvPr id="3" name="Text Placeholder 2"/>
-          <p:cNvSpPr>
-            <a:spLocks noGrp="1"/>
-          </p:cNvSpPr>
-          <p:nvPr>
-            <p:ph type="body" idx="1"/>
-          </p:nvPr>
-        </p:nvSpPr>
-        <p:spPr>
-          <a:xfrm>
-            <a:off x="762000" y="2767013"/>
-            <a:ext cx="7772400" cy="1500187"/>
-          </a:xfrm>
-        </p:spPr>
-        <p:txBody>
-          <a:bodyPr>
-            <a:noAutofit/>
-          </a:bodyPr>
-          <a:lstStyle/>
-          <a:p>
-            <a:r>
-              <a:rPr lang="en-US" sz="8800" dirty="0" smtClean="0"/>
-              <a:t>Current State</a:t>
-            </a:r>
-            <a:endParaRPr lang="en-US" sz="8800" dirty="0"/>
-          </a:p>
-        </p:txBody>
-      </p:sp>
-    </p:spTree>
-    <p:extLst>
-      <p:ext uri="{BB962C8B-B14F-4D97-AF65-F5344CB8AC3E}">
-        <p14:creationId xmlns:p14="http://schemas.microsoft.com/office/powerpoint/2010/main" val="2454386320"/>
-      </p:ext>
-    </p:extLst>
-  </p:cSld>
-  <p:clrMapOvr>
-    <a:masterClrMapping/>
-  </p:clrMapOvr>
-  <p:timing>
-    <p:tnLst>
-      <p:par>
-        <p:cTn id="1" dur="indefinite" restart="never" nodeType="tmRoot"/>
-      </p:par>
-    </p:tnLst>
-  </p:timing>
-</p:sld>
-</file>
-
-<file path=ppt/slides/slide6.xml><?xml version="1.0" encoding="utf-8"?>
-<p:sld xmlns:a="http://schemas.openxmlformats.org/drawingml/2006/main" xmlns:r="http://schemas.openxmlformats.org/officeDocument/2006/relationships" xmlns:p="http://schemas.openxmlformats.org/presentationml/2006/main">
-  <p:cSld>
-    <p:spTree>
-      <p:nvGrpSpPr>
-        <p:cNvPr id="1" name=""/>
-        <p:cNvGrpSpPr/>
-        <p:nvPr/>
-      </p:nvGrpSpPr>
-      <p:grpSpPr>
-        <a:xfrm>
-          <a:off x="0" y="0"/>
-          <a:ext cx="0" cy="0"/>
-          <a:chOff x="0" y="0"/>
-          <a:chExt cx="0" cy="0"/>
-        </a:xfrm>
-      </p:grpSpPr>
-      <p:pic>
-        <p:nvPicPr>
-          <p:cNvPr id="3074" name="Picture 2"/>
-          <p:cNvPicPr>
-            <a:picLocks noChangeAspect="1" noChangeArrowheads="1"/>
-          </p:cNvPicPr>
-          <p:nvPr/>
-        </p:nvPicPr>
-        <p:blipFill>
-          <a:blip r:embed="rId3">
-            <a:extLst>
-              <a:ext uri="{28A0092B-C50C-407E-A947-70E740481C1C}">
-                <a14:useLocalDpi xmlns:a14="http://schemas.microsoft.com/office/drawing/2010/main" val="0"/>
-              </a:ext>
-            </a:extLst>
-          </a:blip>
-          <a:srcRect/>
-          <a:stretch>
-            <a:fillRect/>
-          </a:stretch>
-        </p:blipFill>
-        <p:spPr bwMode="auto">
-          <a:xfrm>
-            <a:off x="71207" y="1180605"/>
-            <a:ext cx="8996593" cy="4565214"/>
-          </a:xfrm>
-          <a:prstGeom prst="rect">
-            <a:avLst/>
-          </a:prstGeom>
-          <a:noFill/>
-          <a:ln>
-            <a:noFill/>
-          </a:ln>
-          <a:effectLst/>
-          <a:extLst>
-            <a:ext uri="{909E8E84-426E-40DD-AFC4-6F175D3DCCD1}">
-              <a14:hiddenFill xmlns:a14="http://schemas.microsoft.com/office/drawing/2010/main">
-                <a:solidFill>
-                  <a:schemeClr val="accent1"/>
-                </a:solidFill>
-              </a14:hiddenFill>
-            </a:ext>
-            <a:ext uri="{91240B29-F687-4F45-9708-019B960494DF}">
-              <a14:hiddenLine xmlns:a14="http://schemas.microsoft.com/office/drawing/2010/main" w="9525">
-                <a:solidFill>
-                  <a:schemeClr val="tx1"/>
-                </a:solidFill>
-                <a:miter lim="800000"/>
-                <a:headEnd/>
-                <a:tailEnd/>
-              </a14:hiddenLine>
-            </a:ext>
-            <a:ext uri="{AF507438-7753-43E0-B8FC-AC1667EBCBE1}">
-              <a14:hiddenEffects xmlns:a14="http://schemas.microsoft.com/office/drawing/2010/main">
-                <a:effectLst>
-                  <a:outerShdw dist="35921" dir="2700000" algn="ctr" rotWithShape="0">
-                    <a:schemeClr val="bg2"/>
-                  </a:outerShdw>
-                </a:effectLst>
-              </a14:hiddenEffects>
-            </a:ext>
-          </a:extLst>
-        </p:spPr>
-      </p:pic>
-    </p:spTree>
-    <p:extLst>
-      <p:ext uri="{BB962C8B-B14F-4D97-AF65-F5344CB8AC3E}">
-        <p14:creationId xmlns:p14="http://schemas.microsoft.com/office/powerpoint/2010/main" val="392081175"/>
-      </p:ext>
-    </p:extLst>
-  </p:cSld>
-  <p:clrMapOvr>
-    <a:masterClrMapping/>
-  </p:clrMapOvr>
-  <p:timing>
-    <p:tnLst>
-      <p:par>
-        <p:cTn id="1" dur="indefinite" restart="never" nodeType="tmRoot"/>
-      </p:par>
-    </p:tnLst>
-  </p:timing>
-</p:sld>
-</file>
-
-<file path=ppt/slides/slide7.xml><?xml version="1.0" encoding="utf-8"?>
-<p:sld xmlns:a="http://schemas.openxmlformats.org/drawingml/2006/main" xmlns:r="http://schemas.openxmlformats.org/officeDocument/2006/relationships" xmlns:p="http://schemas.openxmlformats.org/presentationml/2006/main">
-  <p:cSld>
-    <p:spTree>
-      <p:nvGrpSpPr>
-        <p:cNvPr id="1" name=""/>
-        <p:cNvGrpSpPr/>
-        <p:nvPr/>
-      </p:nvGrpSpPr>
-      <p:grpSpPr>
-        <a:xfrm>
-          <a:off x="0" y="0"/>
-          <a:ext cx="0" cy="0"/>
-          <a:chOff x="0" y="0"/>
-          <a:chExt cx="0" cy="0"/>
-        </a:xfrm>
-      </p:grpSpPr>
-      <p:pic>
-        <p:nvPicPr>
-          <p:cNvPr id="4098" name="Picture 2"/>
-          <p:cNvPicPr>
-            <a:picLocks noChangeAspect="1" noChangeArrowheads="1"/>
-          </p:cNvPicPr>
-          <p:nvPr/>
-        </p:nvPicPr>
-        <p:blipFill>
-          <a:blip r:embed="rId3">
-            <a:extLst>
-              <a:ext uri="{28A0092B-C50C-407E-A947-70E740481C1C}">
-                <a14:useLocalDpi xmlns:a14="http://schemas.microsoft.com/office/drawing/2010/main" val="0"/>
-              </a:ext>
-            </a:extLst>
-          </a:blip>
-          <a:srcRect/>
-          <a:stretch>
-            <a:fillRect/>
-          </a:stretch>
-        </p:blipFill>
-        <p:spPr bwMode="auto">
-          <a:xfrm>
-            <a:off x="28074" y="1981200"/>
-            <a:ext cx="9039726" cy="3200400"/>
-          </a:xfrm>
-          <a:prstGeom prst="rect">
-            <a:avLst/>
-          </a:prstGeom>
-          <a:noFill/>
-          <a:ln>
-            <a:noFill/>
-          </a:ln>
-          <a:effectLst/>
-          <a:extLst>
-            <a:ext uri="{909E8E84-426E-40DD-AFC4-6F175D3DCCD1}">
-              <a14:hiddenFill xmlns:a14="http://schemas.microsoft.com/office/drawing/2010/main">
-                <a:solidFill>
-                  <a:schemeClr val="accent1"/>
-                </a:solidFill>
-              </a14:hiddenFill>
-            </a:ext>
-            <a:ext uri="{91240B29-F687-4F45-9708-019B960494DF}">
-              <a14:hiddenLine xmlns:a14="http://schemas.microsoft.com/office/drawing/2010/main" w="9525">
-                <a:solidFill>
-                  <a:schemeClr val="tx1"/>
-                </a:solidFill>
-                <a:miter lim="800000"/>
-                <a:headEnd/>
-                <a:tailEnd/>
-              </a14:hiddenLine>
-            </a:ext>
-            <a:ext uri="{AF507438-7753-43E0-B8FC-AC1667EBCBE1}">
-              <a14:hiddenEffects xmlns:a14="http://schemas.microsoft.com/office/drawing/2010/main">
-                <a:effectLst>
-                  <a:outerShdw dist="35921" dir="2700000" algn="ctr" rotWithShape="0">
-                    <a:schemeClr val="bg2"/>
-                  </a:outerShdw>
-                </a:effectLst>
-              </a14:hiddenEffects>
-            </a:ext>
-          </a:extLst>
-        </p:spPr>
-      </p:pic>
-    </p:spTree>
-    <p:extLst>
-      <p:ext uri="{BB962C8B-B14F-4D97-AF65-F5344CB8AC3E}">
-        <p14:creationId xmlns:p14="http://schemas.microsoft.com/office/powerpoint/2010/main" val="3521129657"/>
-      </p:ext>
-    </p:extLst>
-  </p:cSld>
-  <p:clrMapOvr>
-    <a:masterClrMapping/>
-  </p:clrMapOvr>
-  <p:timing>
-    <p:tnLst>
-      <p:par>
-        <p:cTn id="1" dur="indefinite" restart="never" nodeType="tmRoot"/>
-      </p:par>
-    </p:tnLst>
-  </p:timing>
-</p:sld>
-</file>
-
-<file path=ppt/slides/slide8.xml><?xml version="1.0" encoding="utf-8"?>
-<p:sld xmlns:a="http://schemas.openxmlformats.org/drawingml/2006/main" xmlns:r="http://schemas.openxmlformats.org/officeDocument/2006/relationships" xmlns:p="http://schemas.openxmlformats.org/presentationml/2006/main">
-  <p:cSld>
-    <p:spTree>
-      <p:nvGrpSpPr>
-        <p:cNvPr id="1" name=""/>
-        <p:cNvGrpSpPr/>
-        <p:nvPr/>
-      </p:nvGrpSpPr>
-      <p:grpSpPr>
-        <a:xfrm>
-          <a:off x="0" y="0"/>
-          <a:ext cx="0" cy="0"/>
-          <a:chOff x="0" y="0"/>
-          <a:chExt cx="0" cy="0"/>
-        </a:xfrm>
-      </p:grpSpPr>
-      <p:pic>
-        <p:nvPicPr>
-          <p:cNvPr id="5122" name="Picture 2"/>
-          <p:cNvPicPr>
-            <a:picLocks noChangeAspect="1" noChangeArrowheads="1"/>
-          </p:cNvPicPr>
-          <p:nvPr/>
-        </p:nvPicPr>
-        <p:blipFill>
-          <a:blip r:embed="rId3">
-            <a:extLst>
-              <a:ext uri="{28A0092B-C50C-407E-A947-70E740481C1C}">
-                <a14:useLocalDpi xmlns:a14="http://schemas.microsoft.com/office/drawing/2010/main" val="0"/>
-              </a:ext>
-            </a:extLst>
-          </a:blip>
-          <a:srcRect/>
-          <a:stretch>
-            <a:fillRect/>
-          </a:stretch>
-        </p:blipFill>
-        <p:spPr bwMode="auto">
-          <a:xfrm>
-            <a:off x="152400" y="2133600"/>
-            <a:ext cx="8862897" cy="2667000"/>
-          </a:xfrm>
-          <a:prstGeom prst="rect">
-            <a:avLst/>
-          </a:prstGeom>
-          <a:noFill/>
-          <a:ln>
-            <a:noFill/>
-          </a:ln>
-          <a:effectLst/>
-          <a:extLst>
-            <a:ext uri="{909E8E84-426E-40DD-AFC4-6F175D3DCCD1}">
-              <a14:hiddenFill xmlns:a14="http://schemas.microsoft.com/office/drawing/2010/main">
-                <a:solidFill>
-                  <a:schemeClr val="accent1"/>
-                </a:solidFill>
-              </a14:hiddenFill>
-            </a:ext>
-            <a:ext uri="{91240B29-F687-4F45-9708-019B960494DF}">
-              <a14:hiddenLine xmlns:a14="http://schemas.microsoft.com/office/drawing/2010/main" w="9525">
-                <a:solidFill>
-                  <a:schemeClr val="tx1"/>
-                </a:solidFill>
-                <a:miter lim="800000"/>
-                <a:headEnd/>
-                <a:tailEnd/>
-              </a14:hiddenLine>
-            </a:ext>
-            <a:ext uri="{AF507438-7753-43E0-B8FC-AC1667EBCBE1}">
-              <a14:hiddenEffects xmlns:a14="http://schemas.microsoft.com/office/drawing/2010/main">
-                <a:effectLst>
-                  <a:outerShdw dist="35921" dir="2700000" algn="ctr" rotWithShape="0">
-                    <a:schemeClr val="bg2"/>
-                  </a:outerShdw>
-                </a:effectLst>
-              </a14:hiddenEffects>
-            </a:ext>
-          </a:extLst>
-        </p:spPr>
-      </p:pic>
-    </p:spTree>
-    <p:extLst>
-      <p:ext uri="{BB962C8B-B14F-4D97-AF65-F5344CB8AC3E}">
-        <p14:creationId xmlns:p14="http://schemas.microsoft.com/office/powerpoint/2010/main" val="3727340800"/>
-      </p:ext>
-    </p:extLst>
-  </p:cSld>
-  <p:clrMapOvr>
-    <a:masterClrMapping/>
-  </p:clrMapOvr>
-  <p:timing>
-    <p:tnLst>
-      <p:par>
-        <p:cTn id="1" dur="indefinite" restart="never" nodeType="tmRoot"/>
-      </p:par>
-    </p:tnLst>
-  </p:timing>
-</p:sld>
-</file>
-
-<file path=ppt/slides/slide9.xml><?xml version="1.0" encoding="utf-8"?>
-<p:sld xmlns:a="http://schemas.openxmlformats.org/drawingml/2006/main" xmlns:r="http://schemas.openxmlformats.org/officeDocument/2006/relationships" xmlns:p="http://schemas.openxmlformats.org/presentationml/2006/main">
-  <p:cSld>
-    <p:spTree>
-      <p:nvGrpSpPr>
-        <p:cNvPr id="1" name=""/>
-        <p:cNvGrpSpPr/>
-        <p:nvPr/>
-      </p:nvGrpSpPr>
-      <p:grpSpPr>
-        <a:xfrm>
-          <a:off x="0" y="0"/>
-          <a:ext cx="0" cy="0"/>
-          <a:chOff x="0" y="0"/>
-          <a:chExt cx="0" cy="0"/>
-        </a:xfrm>
-      </p:grpSpPr>
-      <p:pic>
-        <p:nvPicPr>
-          <p:cNvPr id="6146" name="Picture 2"/>
-          <p:cNvPicPr>
-            <a:picLocks noChangeAspect="1" noChangeArrowheads="1"/>
-          </p:cNvPicPr>
-          <p:nvPr/>
-        </p:nvPicPr>
-        <p:blipFill>
-          <a:blip r:embed="rId3">
-            <a:extLst>
-              <a:ext uri="{28A0092B-C50C-407E-A947-70E740481C1C}">
-                <a14:useLocalDpi xmlns:a14="http://schemas.microsoft.com/office/drawing/2010/main" val="0"/>
-              </a:ext>
-            </a:extLst>
-          </a:blip>
-          <a:srcRect/>
-          <a:stretch>
-            <a:fillRect/>
-          </a:stretch>
-        </p:blipFill>
-        <p:spPr bwMode="auto">
-          <a:xfrm>
-            <a:off x="1295400" y="1905000"/>
-            <a:ext cx="6759677" cy="3048000"/>
-          </a:xfrm>
-          <a:prstGeom prst="rect">
-            <a:avLst/>
-          </a:prstGeom>
-          <a:noFill/>
-          <a:ln>
-            <a:noFill/>
-          </a:ln>
-          <a:effectLst/>
-          <a:extLst>
-            <a:ext uri="{909E8E84-426E-40DD-AFC4-6F175D3DCCD1}">
-              <a14:hiddenFill xmlns:a14="http://schemas.microsoft.com/office/drawing/2010/main">
-                <a:solidFill>
-                  <a:schemeClr val="accent1"/>
-                </a:solidFill>
-              </a14:hiddenFill>
-            </a:ext>
-            <a:ext uri="{91240B29-F687-4F45-9708-019B960494DF}">
-              <a14:hiddenLine xmlns:a14="http://schemas.microsoft.com/office/drawing/2010/main" w="9525">
-                <a:solidFill>
-                  <a:schemeClr val="tx1"/>
-                </a:solidFill>
-                <a:miter lim="800000"/>
-                <a:headEnd/>
-                <a:tailEnd/>
-              </a14:hiddenLine>
-            </a:ext>
-            <a:ext uri="{AF507438-7753-43E0-B8FC-AC1667EBCBE1}">
-              <a14:hiddenEffects xmlns:a14="http://schemas.microsoft.com/office/drawing/2010/main">
-                <a:effectLst>
-                  <a:outerShdw dist="35921" dir="2700000" algn="ctr" rotWithShape="0">
-                    <a:schemeClr val="bg2"/>
-                  </a:outerShdw>
-                </a:effectLst>
-              </a14:hiddenEffects>
-            </a:ext>
-          </a:extLst>
-        </p:spPr>
-      </p:pic>
-    </p:spTree>
-    <p:extLst>
-      <p:ext uri="{BB962C8B-B14F-4D97-AF65-F5344CB8AC3E}">
-        <p14:creationId xmlns:p14="http://schemas.microsoft.com/office/powerpoint/2010/main" val="2224897939"/>
-      </p:ext>
-    </p:extLst>
-  </p:cSld>
-  <p:clrMapOvr>
-    <a:masterClrMapping/>
-  </p:clrMapOvr>
-  <p:timing>
-    <p:tnLst>
-      <p:par>
-        <p:cTn id="1" dur="indefinite" restart="never" nodeType="tmRoot"/>
-      </p:par>
-    </p:tnLst>
-  </p:timing>
-</p:sld>
+<file path=ppt/tags/tag1.xml><?xml version="1.0" encoding="utf-8"?>
+<p:tagLst xmlns:a="http://schemas.openxmlformats.org/drawingml/2006/main" xmlns:r="http://schemas.openxmlformats.org/officeDocument/2006/relationships" xmlns:p="http://schemas.openxmlformats.org/presentationml/2006/main">
+  <p:tag name="DVSHAPEID" val="c15ziaJfYCcQja0CDalT7U"/>
+</p:tagLst>
+</file>
+
+<file path=ppt/tags/tag10.xml><?xml version="1.0" encoding="utf-8"?>
+<p:tagLst xmlns:a="http://schemas.openxmlformats.org/drawingml/2006/main" xmlns:r="http://schemas.openxmlformats.org/officeDocument/2006/relationships" xmlns:p="http://schemas.openxmlformats.org/presentationml/2006/main">
+  <p:tag name="DVSHAPEID" val="9G0MjT7ylTYTh4vo3x9Esp"/>
+</p:tagLst>
+</file>
+
+<file path=ppt/tags/tag11.xml><?xml version="1.0" encoding="utf-8"?>
+<p:tagLst xmlns:a="http://schemas.openxmlformats.org/drawingml/2006/main" xmlns:r="http://schemas.openxmlformats.org/officeDocument/2006/relationships" xmlns:p="http://schemas.openxmlformats.org/presentationml/2006/main">
+  <p:tag name="DVSHAPEID" val="Rrywzjr5EVB4HAiCxEeeQm"/>
+</p:tagLst>
+</file>
+
+<file path=ppt/tags/tag12.xml><?xml version="1.0" encoding="utf-8"?>
+<p:tagLst xmlns:a="http://schemas.openxmlformats.org/drawingml/2006/main" xmlns:r="http://schemas.openxmlformats.org/officeDocument/2006/relationships" xmlns:p="http://schemas.openxmlformats.org/presentationml/2006/main">
+  <p:tag name="DVSHAPEID" val="mJ7lXqTFtejJPydMkN7ff3"/>
+</p:tagLst>
+</file>
+
+<file path=ppt/tags/tag13.xml><?xml version="1.0" encoding="utf-8"?>
+<p:tagLst xmlns:a="http://schemas.openxmlformats.org/drawingml/2006/main" xmlns:r="http://schemas.openxmlformats.org/officeDocument/2006/relationships" xmlns:p="http://schemas.openxmlformats.org/presentationml/2006/main">
+  <p:tag name="DVSHAPEID" val="hcmV5rZupdyu4Oodm0cYrn"/>
+</p:tagLst>
+</file>
+
+<file path=ppt/tags/tag14.xml><?xml version="1.0" encoding="utf-8"?>
+<p:tagLst xmlns:a="http://schemas.openxmlformats.org/drawingml/2006/main" xmlns:r="http://schemas.openxmlformats.org/officeDocument/2006/relationships" xmlns:p="http://schemas.openxmlformats.org/presentationml/2006/main">
+  <p:tag name="DVSHAPEID" val="LXLKoLkr7A7jsVZ1lsGZP6"/>
+</p:tagLst>
+</file>
+
+<file path=ppt/tags/tag15.xml><?xml version="1.0" encoding="utf-8"?>
+<p:tagLst xmlns:a="http://schemas.openxmlformats.org/drawingml/2006/main" xmlns:r="http://schemas.openxmlformats.org/officeDocument/2006/relationships" xmlns:p="http://schemas.openxmlformats.org/presentationml/2006/main">
+  <p:tag name="DVSHAPEID" val="bkton6r63gBTrp9l3daY6X"/>
+</p:tagLst>
+</file>
+
+<file path=ppt/tags/tag16.xml><?xml version="1.0" encoding="utf-8"?>
+<p:tagLst xmlns:a="http://schemas.openxmlformats.org/drawingml/2006/main" xmlns:r="http://schemas.openxmlformats.org/officeDocument/2006/relationships" xmlns:p="http://schemas.openxmlformats.org/presentationml/2006/main">
+  <p:tag name="DVSHAPEID" val="nLmtekFKisyEMqhZndZ1xR"/>
+</p:tagLst>
+</file>
+
+<file path=ppt/tags/tag17.xml><?xml version="1.0" encoding="utf-8"?>
+<p:tagLst xmlns:a="http://schemas.openxmlformats.org/drawingml/2006/main" xmlns:r="http://schemas.openxmlformats.org/officeDocument/2006/relationships" xmlns:p="http://schemas.openxmlformats.org/presentationml/2006/main">
+  <p:tag name="DVSHAPEID" val="IyuzSZpsOQ0dXI2TS7rjX9"/>
+</p:tagLst>
+</file>
+
+<file path=ppt/tags/tag18.xml><?xml version="1.0" encoding="utf-8"?>
+<p:tagLst xmlns:a="http://schemas.openxmlformats.org/drawingml/2006/main" xmlns:r="http://schemas.openxmlformats.org/officeDocument/2006/relationships" xmlns:p="http://schemas.openxmlformats.org/presentationml/2006/main">
+  <p:tag name="DVSHAPEID" val="lMCI43QWY5qw2OZEsFlQDH"/>
+</p:tagLst>
+</file>
+
+<file path=ppt/tags/tag19.xml><?xml version="1.0" encoding="utf-8"?>
+<p:tagLst xmlns:a="http://schemas.openxmlformats.org/drawingml/2006/main" xmlns:r="http://schemas.openxmlformats.org/officeDocument/2006/relationships" xmlns:p="http://schemas.openxmlformats.org/presentationml/2006/main">
+  <p:tag name="DVSHAPEID" val="EztyXtlSzdTzdHW9VlCSSV"/>
+</p:tagLst>
+</file>
+
+<file path=ppt/tags/tag2.xml><?xml version="1.0" encoding="utf-8"?>
+<p:tagLst xmlns:a="http://schemas.openxmlformats.org/drawingml/2006/main" xmlns:r="http://schemas.openxmlformats.org/officeDocument/2006/relationships" xmlns:p="http://schemas.openxmlformats.org/presentationml/2006/main">
+  <p:tag name="DVSHAPEID" val="36u3ZExqgD1Ibr7Ou8GBJL"/>
+</p:tagLst>
+</file>
+
+<file path=ppt/tags/tag20.xml><?xml version="1.0" encoding="utf-8"?>
+<p:tagLst xmlns:a="http://schemas.openxmlformats.org/drawingml/2006/main" xmlns:r="http://schemas.openxmlformats.org/officeDocument/2006/relationships" xmlns:p="http://schemas.openxmlformats.org/presentationml/2006/main">
+  <p:tag name="DVSHAPEID" val="MqFdUeELY7vD73fv5mB6vc"/>
+</p:tagLst>
+</file>
+
+<file path=ppt/tags/tag21.xml><?xml version="1.0" encoding="utf-8"?>
+<p:tagLst xmlns:a="http://schemas.openxmlformats.org/drawingml/2006/main" xmlns:r="http://schemas.openxmlformats.org/officeDocument/2006/relationships" xmlns:p="http://schemas.openxmlformats.org/presentationml/2006/main">
+  <p:tag name="DVSHAPEID" val="CtBiHjKZdLPJM2TKz7dOfL"/>
+</p:tagLst>
+</file>
+
+<file path=ppt/tags/tag22.xml><?xml version="1.0" encoding="utf-8"?>
+<p:tagLst xmlns:a="http://schemas.openxmlformats.org/drawingml/2006/main" xmlns:r="http://schemas.openxmlformats.org/officeDocument/2006/relationships" xmlns:p="http://schemas.openxmlformats.org/presentationml/2006/main">
+  <p:tag name="DVSHAPEID" val="3zATTpfggMpzObCCwl0ZUK"/>
+</p:tagLst>
+</file>
+
+<file path=ppt/tags/tag23.xml><?xml version="1.0" encoding="utf-8"?>
+<p:tagLst xmlns:a="http://schemas.openxmlformats.org/drawingml/2006/main" xmlns:r="http://schemas.openxmlformats.org/officeDocument/2006/relationships" xmlns:p="http://schemas.openxmlformats.org/presentationml/2006/main">
+  <p:tag name="DVSHAPEID" val="OnhcClMuSGXRq1HOpkJXu2"/>
+</p:tagLst>
+</file>
+
+<file path=ppt/tags/tag24.xml><?xml version="1.0" encoding="utf-8"?>
+<p:tagLst xmlns:a="http://schemas.openxmlformats.org/drawingml/2006/main" xmlns:r="http://schemas.openxmlformats.org/officeDocument/2006/relationships" xmlns:p="http://schemas.openxmlformats.org/presentationml/2006/main">
+  <p:tag name="DVSECTIONID" val="3C0ysUuhA2MRjSTsyJAbhc"/>
+</p:tagLst>
+</file>
+
+<file path=ppt/tags/tag25.xml><?xml version="1.0" encoding="utf-8"?>
+<p:tagLst xmlns:a="http://schemas.openxmlformats.org/drawingml/2006/main" xmlns:r="http://schemas.openxmlformats.org/officeDocument/2006/relationships" xmlns:p="http://schemas.openxmlformats.org/presentationml/2006/main">
+  <p:tag name="DVSHAPEID" val="jMiABeJDkFJYdhOOh2C4gX"/>
+</p:tagLst>
+</file>
+
+<file path=ppt/tags/tag26.xml><?xml version="1.0" encoding="utf-8"?>
+<p:tagLst xmlns:a="http://schemas.openxmlformats.org/drawingml/2006/main" xmlns:r="http://schemas.openxmlformats.org/officeDocument/2006/relationships" xmlns:p="http://schemas.openxmlformats.org/presentationml/2006/main">
+  <p:tag name="DVSHAPEID" val="CoSpEST9jPaFXxF7pJn9aO"/>
+</p:tagLst>
+</file>
+
+<file path=ppt/tags/tag27.xml><?xml version="1.0" encoding="utf-8"?>
+<p:tagLst xmlns:a="http://schemas.openxmlformats.org/drawingml/2006/main" xmlns:r="http://schemas.openxmlformats.org/officeDocument/2006/relationships" xmlns:p="http://schemas.openxmlformats.org/presentationml/2006/main">
+  <p:tag name="DVSECTIONID" val="954DLsONlp9SVYKHguXKrn"/>
+</p:tagLst>
+</file>
+
+<file path=ppt/tags/tag28.xml><?xml version="1.0" encoding="utf-8"?>
+<p:tagLst xmlns:a="http://schemas.openxmlformats.org/drawingml/2006/main" xmlns:r="http://schemas.openxmlformats.org/officeDocument/2006/relationships" xmlns:p="http://schemas.openxmlformats.org/presentationml/2006/main">
+  <p:tag name="DVSHAPEID" val="y8xPSOljVmvmaUIbAQKblU"/>
+</p:tagLst>
+</file>
+
+<file path=ppt/tags/tag29.xml><?xml version="1.0" encoding="utf-8"?>
+<p:tagLst xmlns:a="http://schemas.openxmlformats.org/drawingml/2006/main" xmlns:r="http://schemas.openxmlformats.org/officeDocument/2006/relationships" xmlns:p="http://schemas.openxmlformats.org/presentationml/2006/main">
+  <p:tag name="DVSECTIONID" val="KWab8awL47ERtVtO91tNHm"/>
+</p:tagLst>
+</file>
+
+<file path=ppt/tags/tag3.xml><?xml version="1.0" encoding="utf-8"?>
+<p:tagLst xmlns:a="http://schemas.openxmlformats.org/drawingml/2006/main" xmlns:r="http://schemas.openxmlformats.org/officeDocument/2006/relationships" xmlns:p="http://schemas.openxmlformats.org/presentationml/2006/main">
+  <p:tag name="DVSHAPEID" val="kS9QljkOt6JhXY5fb4Ixly"/>
+</p:tagLst>
+</file>
+
+<file path=ppt/tags/tag30.xml><?xml version="1.0" encoding="utf-8"?>
+<p:tagLst xmlns:a="http://schemas.openxmlformats.org/drawingml/2006/main" xmlns:r="http://schemas.openxmlformats.org/officeDocument/2006/relationships" xmlns:p="http://schemas.openxmlformats.org/presentationml/2006/main">
+  <p:tag name="DVSHAPEID" val="Nxjg8aCSG7NOPJSP04O0UO"/>
+</p:tagLst>
+</file>
+
+<file path=ppt/tags/tag31.xml><?xml version="1.0" encoding="utf-8"?>
+<p:tagLst xmlns:a="http://schemas.openxmlformats.org/drawingml/2006/main" xmlns:r="http://schemas.openxmlformats.org/officeDocument/2006/relationships" xmlns:p="http://schemas.openxmlformats.org/presentationml/2006/main">
+  <p:tag name="DVSECTIONID" val="HqXVIQt6dwKMk7tzjDgzl1"/>
+</p:tagLst>
+</file>
+
+<file path=ppt/tags/tag32.xml><?xml version="1.0" encoding="utf-8"?>
+<p:tagLst xmlns:a="http://schemas.openxmlformats.org/drawingml/2006/main" xmlns:r="http://schemas.openxmlformats.org/officeDocument/2006/relationships" xmlns:p="http://schemas.openxmlformats.org/presentationml/2006/main">
+  <p:tag name="DVSHAPEID" val="aBnLoe9woYsEkZvBFaG2Gn"/>
+</p:tagLst>
+</file>
+
+<file path=ppt/tags/tag33.xml><?xml version="1.0" encoding="utf-8"?>
+<p:tagLst xmlns:a="http://schemas.openxmlformats.org/drawingml/2006/main" xmlns:r="http://schemas.openxmlformats.org/officeDocument/2006/relationships" xmlns:p="http://schemas.openxmlformats.org/presentationml/2006/main">
+  <p:tag name="DVSECTIONID" val="e4vPerkWhDFnfJedsGiXU8"/>
+</p:tagLst>
+</file>
+
+<file path=ppt/tags/tag34.xml><?xml version="1.0" encoding="utf-8"?>
+<p:tagLst xmlns:a="http://schemas.openxmlformats.org/drawingml/2006/main" xmlns:r="http://schemas.openxmlformats.org/officeDocument/2006/relationships" xmlns:p="http://schemas.openxmlformats.org/presentationml/2006/main">
+  <p:tag name="DVSHAPEID" val="yl4YjLQFnlZZnHTnMoJ9IO"/>
+</p:tagLst>
+</file>
+
+<file path=ppt/tags/tag35.xml><?xml version="1.0" encoding="utf-8"?>
+<p:tagLst xmlns:a="http://schemas.openxmlformats.org/drawingml/2006/main" xmlns:r="http://schemas.openxmlformats.org/officeDocument/2006/relationships" xmlns:p="http://schemas.openxmlformats.org/presentationml/2006/main">
+  <p:tag name="DVSECTIONID" val="6GAmlzIPx70FcTpTC1Lhe6"/>
+</p:tagLst>
+</file>
+
+<file path=ppt/tags/tag36.xml><?xml version="1.0" encoding="utf-8"?>
+<p:tagLst xmlns:a="http://schemas.openxmlformats.org/drawingml/2006/main" xmlns:r="http://schemas.openxmlformats.org/officeDocument/2006/relationships" xmlns:p="http://schemas.openxmlformats.org/presentationml/2006/main">
+  <p:tag name="DVSHAPEID" val="lapSjooDjR8M22GpUnGIB7"/>
+</p:tagLst>
+</file>
+
+<file path=ppt/tags/tag37.xml><?xml version="1.0" encoding="utf-8"?>
+<p:tagLst xmlns:a="http://schemas.openxmlformats.org/drawingml/2006/main" xmlns:r="http://schemas.openxmlformats.org/officeDocument/2006/relationships" xmlns:p="http://schemas.openxmlformats.org/presentationml/2006/main">
+  <p:tag name="DVSECTIONID" val="6WSJl6bzgn75XPeR6Les6x"/>
+</p:tagLst>
+</file>
+
+<file path=ppt/tags/tag38.xml><?xml version="1.0" encoding="utf-8"?>
+<p:tagLst xmlns:a="http://schemas.openxmlformats.org/drawingml/2006/main" xmlns:r="http://schemas.openxmlformats.org/officeDocument/2006/relationships" xmlns:p="http://schemas.openxmlformats.org/presentationml/2006/main">
+  <p:tag name="DVSHAPEID" val="EkCNIioijwFKZTzqrsgJ18"/>
+</p:tagLst>
+</file>
+
+<file path=ppt/tags/tag39.xml><?xml version="1.0" encoding="utf-8"?>
+<p:tagLst xmlns:a="http://schemas.openxmlformats.org/drawingml/2006/main" xmlns:r="http://schemas.openxmlformats.org/officeDocument/2006/relationships" xmlns:p="http://schemas.openxmlformats.org/presentationml/2006/main">
+  <p:tag name="DVSECTIONID" val="mzxkNy4hcCU0zEtCdBDYQC"/>
+</p:tagLst>
+</file>
+
+<file path=ppt/tags/tag4.xml><?xml version="1.0" encoding="utf-8"?>
+<p:tagLst xmlns:a="http://schemas.openxmlformats.org/drawingml/2006/main" xmlns:r="http://schemas.openxmlformats.org/officeDocument/2006/relationships" xmlns:p="http://schemas.openxmlformats.org/presentationml/2006/main">
+  <p:tag name="DVSHAPEID" val="PBYzuPFddvbiMBT8ie5saV"/>
+</p:tagLst>
+</file>
+
+<file path=ppt/tags/tag40.xml><?xml version="1.0" encoding="utf-8"?>
+<p:tagLst xmlns:a="http://schemas.openxmlformats.org/drawingml/2006/main" xmlns:r="http://schemas.openxmlformats.org/officeDocument/2006/relationships" xmlns:p="http://schemas.openxmlformats.org/presentationml/2006/main">
+  <p:tag name="DVSHAPEID" val="RAERGmtltZcew4gwG6e0yB"/>
+</p:tagLst>
+</file>
+
+<file path=ppt/tags/tag41.xml><?xml version="1.0" encoding="utf-8"?>
+<p:tagLst xmlns:a="http://schemas.openxmlformats.org/drawingml/2006/main" xmlns:r="http://schemas.openxmlformats.org/officeDocument/2006/relationships" xmlns:p="http://schemas.openxmlformats.org/presentationml/2006/main">
+  <p:tag name="DVSECTIONID" val="x6WAEKUZ3L0yzjb0jCvZbv"/>
+</p:tagLst>
+</file>
+
+<file path=ppt/tags/tag42.xml><?xml version="1.0" encoding="utf-8"?>
+<p:tagLst xmlns:a="http://schemas.openxmlformats.org/drawingml/2006/main" xmlns:r="http://schemas.openxmlformats.org/officeDocument/2006/relationships" xmlns:p="http://schemas.openxmlformats.org/presentationml/2006/main">
+  <p:tag name="DVSHAPEID" val="7i2NQtVdrR5wt18RC2PX2F"/>
+</p:tagLst>
+</file>
+
+<file path=ppt/tags/tag43.xml><?xml version="1.0" encoding="utf-8"?>
+<p:tagLst xmlns:a="http://schemas.openxmlformats.org/drawingml/2006/main" xmlns:r="http://schemas.openxmlformats.org/officeDocument/2006/relationships" xmlns:p="http://schemas.openxmlformats.org/presentationml/2006/main">
+  <p:tag name="DVSECTIONID" val="bWfAouxCP8HK1qodUjmcy8"/>
+</p:tagLst>
+</file>
+
+<file path=ppt/tags/tag44.xml><?xml version="1.0" encoding="utf-8"?>
+<p:tagLst xmlns:a="http://schemas.openxmlformats.org/drawingml/2006/main" xmlns:r="http://schemas.openxmlformats.org/officeDocument/2006/relationships" xmlns:p="http://schemas.openxmlformats.org/presentationml/2006/main">
+  <p:tag name="DVSHAPEID" val="xLnvaVMav0AftmOSwZpgyk"/>
+</p:tagLst>
+</file>
+
+<file path=ppt/tags/tag45.xml><?xml version="1.0" encoding="utf-8"?>
+<p:tagLst xmlns:a="http://schemas.openxmlformats.org/drawingml/2006/main" xmlns:r="http://schemas.openxmlformats.org/officeDocument/2006/relationships" xmlns:p="http://schemas.openxmlformats.org/presentationml/2006/main">
+  <p:tag name="DVSECTIONID" val="004aqdi0sRr2VZk4mqsrWS"/>
+</p:tagLst>
+</file>
+
+<file path=ppt/tags/tag46.xml><?xml version="1.0" encoding="utf-8"?>
+<p:tagLst xmlns:a="http://schemas.openxmlformats.org/drawingml/2006/main" xmlns:r="http://schemas.openxmlformats.org/officeDocument/2006/relationships" xmlns:p="http://schemas.openxmlformats.org/presentationml/2006/main">
+  <p:tag name="DVSHAPEID" val="9ZBenOucbAzsLhpli0rhm4"/>
+</p:tagLst>
+</file>
+
+<file path=ppt/tags/tag47.xml><?xml version="1.0" encoding="utf-8"?>
+<p:tagLst xmlns:a="http://schemas.openxmlformats.org/drawingml/2006/main" xmlns:r="http://schemas.openxmlformats.org/officeDocument/2006/relationships" xmlns:p="http://schemas.openxmlformats.org/presentationml/2006/main">
+  <p:tag name="DVSECTIONID" val="RPhLB6IbDYX2Wfve3jkOFP"/>
+</p:tagLst>
+</file>
+
+<file path=ppt/tags/tag48.xml><?xml version="1.0" encoding="utf-8"?>
+<p:tagLst xmlns:a="http://schemas.openxmlformats.org/drawingml/2006/main" xmlns:r="http://schemas.openxmlformats.org/officeDocument/2006/relationships" xmlns:p="http://schemas.openxmlformats.org/presentationml/2006/main">
+  <p:tag name="DVSHAPEID" val="WdyM2JwPxM7cBnTWyXGjOZ"/>
+</p:tagLst>
+</file>
+
+<file path=ppt/tags/tag49.xml><?xml version="1.0" encoding="utf-8"?>
+<p:tagLst xmlns:a="http://schemas.openxmlformats.org/drawingml/2006/main" xmlns:r="http://schemas.openxmlformats.org/officeDocument/2006/relationships" xmlns:p="http://schemas.openxmlformats.org/presentationml/2006/main">
+  <p:tag name="DVSECTIONID" val="iYupSPXVK7c88eSFBbihds"/>
+</p:tagLst>
+</file>
+
+<file path=ppt/tags/tag5.xml><?xml version="1.0" encoding="utf-8"?>
+<p:tagLst xmlns:a="http://schemas.openxmlformats.org/drawingml/2006/main" xmlns:r="http://schemas.openxmlformats.org/officeDocument/2006/relationships" xmlns:p="http://schemas.openxmlformats.org/presentationml/2006/main">
+  <p:tag name="DVSHAPEID" val="ZTt9JeWBTbpM3xSMOu8gSd"/>
+</p:tagLst>
+</file>
+
+<file path=ppt/tags/tag50.xml><?xml version="1.0" encoding="utf-8"?>
+<p:tagLst xmlns:a="http://schemas.openxmlformats.org/drawingml/2006/main" xmlns:r="http://schemas.openxmlformats.org/officeDocument/2006/relationships" xmlns:p="http://schemas.openxmlformats.org/presentationml/2006/main">
+  <p:tag name="DVSHAPEID" val="F1AxtbGpOhY43nGAMKFm2N"/>
+</p:tagLst>
+</file>
+
+<file path=ppt/tags/tag51.xml><?xml version="1.0" encoding="utf-8"?>
+<p:tagLst xmlns:a="http://schemas.openxmlformats.org/drawingml/2006/main" xmlns:r="http://schemas.openxmlformats.org/officeDocument/2006/relationships" xmlns:p="http://schemas.openxmlformats.org/presentationml/2006/main">
+  <p:tag name="DVSECTIONID" val="5T25y8m868c1xigcdTdHeP"/>
+</p:tagLst>
+</file>
+
+<file path=ppt/tags/tag52.xml><?xml version="1.0" encoding="utf-8"?>
+<p:tagLst xmlns:a="http://schemas.openxmlformats.org/drawingml/2006/main" xmlns:r="http://schemas.openxmlformats.org/officeDocument/2006/relationships" xmlns:p="http://schemas.openxmlformats.org/presentationml/2006/main">
+  <p:tag name="DVSHAPEID" val="lzF1rmstA3fWxwcugk88XP"/>
+</p:tagLst>
+</file>
+
+<file path=ppt/tags/tag53.xml><?xml version="1.0" encoding="utf-8"?>
+<p:tagLst xmlns:a="http://schemas.openxmlformats.org/drawingml/2006/main" xmlns:r="http://schemas.openxmlformats.org/officeDocument/2006/relationships" xmlns:p="http://schemas.openxmlformats.org/presentationml/2006/main">
+  <p:tag name="DVSHAPEID" val="dxkvfXbVDsWSG1SrJjXkGV"/>
+</p:tagLst>
+</file>
+
+<file path=ppt/tags/tag54.xml><?xml version="1.0" encoding="utf-8"?>
+<p:tagLst xmlns:a="http://schemas.openxmlformats.org/drawingml/2006/main" xmlns:r="http://schemas.openxmlformats.org/officeDocument/2006/relationships" xmlns:p="http://schemas.openxmlformats.org/presentationml/2006/main">
+  <p:tag name="DVSECTIONID" val="QO6hloI8woCPTBmMgPzB14"/>
+</p:tagLst>
+</file>
+
+<file path=ppt/tags/tag55.xml><?xml version="1.0" encoding="utf-8"?>
+<p:tagLst xmlns:a="http://schemas.openxmlformats.org/drawingml/2006/main" xmlns:r="http://schemas.openxmlformats.org/officeDocument/2006/relationships" xmlns:p="http://schemas.openxmlformats.org/presentationml/2006/main">
+  <p:tag name="DVSHAPEID" val="O7Q9ohuldUQvl8HV6uiFpM"/>
+</p:tagLst>
+</file>
+
+<file path=ppt/tags/tag56.xml><?xml version="1.0" encoding="utf-8"?>
+<p:tagLst xmlns:a="http://schemas.openxmlformats.org/drawingml/2006/main" xmlns:r="http://schemas.openxmlformats.org/officeDocument/2006/relationships" xmlns:p="http://schemas.openxmlformats.org/presentationml/2006/main">
+  <p:tag name="DVSHAPEID" val="ZFQbCOAOaC9iIcF6yTqif1"/>
+</p:tagLst>
+</file>
+
+<file path=ppt/tags/tag57.xml><?xml version="1.0" encoding="utf-8"?>
+<p:tagLst xmlns:a="http://schemas.openxmlformats.org/drawingml/2006/main" xmlns:r="http://schemas.openxmlformats.org/officeDocument/2006/relationships" xmlns:p="http://schemas.openxmlformats.org/presentationml/2006/main">
+  <p:tag name="DVSECTIONID" val="V6HzppYo3vef3dYhMYqXBO"/>
+</p:tagLst>
+</file>
+
+<file path=ppt/tags/tag58.xml><?xml version="1.0" encoding="utf-8"?>
+<p:tagLst xmlns:a="http://schemas.openxmlformats.org/drawingml/2006/main" xmlns:r="http://schemas.openxmlformats.org/officeDocument/2006/relationships" xmlns:p="http://schemas.openxmlformats.org/presentationml/2006/main">
+  <p:tag name="DVSHAPEID" val="1bFJJOds21v17bidEGKoKd"/>
+</p:tagLst>
+</file>
+
+<file path=ppt/tags/tag59.xml><?xml version="1.0" encoding="utf-8"?>
+<p:tagLst xmlns:a="http://schemas.openxmlformats.org/drawingml/2006/main" xmlns:r="http://schemas.openxmlformats.org/officeDocument/2006/relationships" xmlns:p="http://schemas.openxmlformats.org/presentationml/2006/main">
+  <p:tag name="DVSHAPEID" val="l3qug0Voe7xXDFvT5MBHA8"/>
+</p:tagLst>
+</file>
+
+<file path=ppt/tags/tag6.xml><?xml version="1.0" encoding="utf-8"?>
+<p:tagLst xmlns:a="http://schemas.openxmlformats.org/drawingml/2006/main" xmlns:r="http://schemas.openxmlformats.org/officeDocument/2006/relationships" xmlns:p="http://schemas.openxmlformats.org/presentationml/2006/main">
+  <p:tag name="DVSHAPEID" val="6Fbtl3MtrSoUC45l6qgCBZ"/>
+</p:tagLst>
+</file>
+
+<file path=ppt/tags/tag60.xml><?xml version="1.0" encoding="utf-8"?>
+<p:tagLst xmlns:a="http://schemas.openxmlformats.org/drawingml/2006/main" xmlns:r="http://schemas.openxmlformats.org/officeDocument/2006/relationships" xmlns:p="http://schemas.openxmlformats.org/presentationml/2006/main">
+  <p:tag name="DVSHAPEID" val="MG5uNlfKyRhOPCjexcwDNo"/>
+</p:tagLst>
+</file>
+
+<file path=ppt/tags/tag61.xml><?xml version="1.0" encoding="utf-8"?>
+<p:tagLst xmlns:a="http://schemas.openxmlformats.org/drawingml/2006/main" xmlns:r="http://schemas.openxmlformats.org/officeDocument/2006/relationships" xmlns:p="http://schemas.openxmlformats.org/presentationml/2006/main">
+  <p:tag name="DVSECTIONID" val="pHpEPrCo8COLT0zLZja7k6"/>
+</p:tagLst>
+</file>
+
+<file path=ppt/tags/tag62.xml><?xml version="1.0" encoding="utf-8"?>
+<p:tagLst xmlns:a="http://schemas.openxmlformats.org/drawingml/2006/main" xmlns:r="http://schemas.openxmlformats.org/officeDocument/2006/relationships" xmlns:p="http://schemas.openxmlformats.org/presentationml/2006/main">
+  <p:tag name="DVSHAPEID" val="u9xDILAXM2CdgJpMcA9tzG"/>
+</p:tagLst>
+</file>
+
+<file path=ppt/tags/tag63.xml><?xml version="1.0" encoding="utf-8"?>
+<p:tagLst xmlns:a="http://schemas.openxmlformats.org/drawingml/2006/main" xmlns:r="http://schemas.openxmlformats.org/officeDocument/2006/relationships" xmlns:p="http://schemas.openxmlformats.org/presentationml/2006/main">
+  <p:tag name="DVSHAPEID" val="GOPSzQepbXlnbVWaCuaA4f"/>
+</p:tagLst>
+</file>
+
+<file path=ppt/tags/tag64.xml><?xml version="1.0" encoding="utf-8"?>
+<p:tagLst xmlns:a="http://schemas.openxmlformats.org/drawingml/2006/main" xmlns:r="http://schemas.openxmlformats.org/officeDocument/2006/relationships" xmlns:p="http://schemas.openxmlformats.org/presentationml/2006/main">
+  <p:tag name="DVSECTIONID" val="AEy8NZ2Bb3s6HZaKzwMFnB"/>
+</p:tagLst>
+</file>
+
+<file path=ppt/tags/tag65.xml><?xml version="1.0" encoding="utf-8"?>
+<p:tagLst xmlns:a="http://schemas.openxmlformats.org/drawingml/2006/main" xmlns:r="http://schemas.openxmlformats.org/officeDocument/2006/relationships" xmlns:p="http://schemas.openxmlformats.org/presentationml/2006/main">
+  <p:tag name="DVSHAPEID" val="bCmzPL0WujPNtINPbKInRF"/>
+</p:tagLst>
+</file>
+
+<file path=ppt/tags/tag66.xml><?xml version="1.0" encoding="utf-8"?>
+<p:tagLst xmlns:a="http://schemas.openxmlformats.org/drawingml/2006/main" xmlns:r="http://schemas.openxmlformats.org/officeDocument/2006/relationships" xmlns:p="http://schemas.openxmlformats.org/presentationml/2006/main">
+  <p:tag name="DVSHAPEID" val="SSytP1XEjYBrDdw00tpft1"/>
+</p:tagLst>
+</file>
+
+<file path=ppt/tags/tag67.xml><?xml version="1.0" encoding="utf-8"?>
+<p:tagLst xmlns:a="http://schemas.openxmlformats.org/drawingml/2006/main" xmlns:r="http://schemas.openxmlformats.org/officeDocument/2006/relationships" xmlns:p="http://schemas.openxmlformats.org/presentationml/2006/main">
+  <p:tag name="DVSECTIONID" val="qhkYH0Y7Nuti7K6GDDlxrL"/>
+</p:tagLst>
+</file>
+
+<file path=ppt/tags/tag68.xml><?xml version="1.0" encoding="utf-8"?>
+<p:tagLst xmlns:a="http://schemas.openxmlformats.org/drawingml/2006/main" xmlns:r="http://schemas.openxmlformats.org/officeDocument/2006/relationships" xmlns:p="http://schemas.openxmlformats.org/presentationml/2006/main">
+  <p:tag name="DVSHAPEID" val="ynsdnNjpRHnwJt1mVYYP0Q"/>
+</p:tagLst>
+</file>
+
+<file path=ppt/tags/tag7.xml><?xml version="1.0" encoding="utf-8"?>
+<p:tagLst xmlns:a="http://schemas.openxmlformats.org/drawingml/2006/main" xmlns:r="http://schemas.openxmlformats.org/officeDocument/2006/relationships" xmlns:p="http://schemas.openxmlformats.org/presentationml/2006/main">
+  <p:tag name="DVSHAPEID" val="S0ylgvqAkT2LNNXfTTOpJw"/>
+</p:tagLst>
+</file>
+
+<file path=ppt/tags/tag8.xml><?xml version="1.0" encoding="utf-8"?>
+<p:tagLst xmlns:a="http://schemas.openxmlformats.org/drawingml/2006/main" xmlns:r="http://schemas.openxmlformats.org/officeDocument/2006/relationships" xmlns:p="http://schemas.openxmlformats.org/presentationml/2006/main">
+  <p:tag name="DVSHAPEID" val="n8VNGsoH0gB6NbVZMg3Qyu"/>
+</p:tagLst>
+</file>
+
+<file path=ppt/tags/tag9.xml><?xml version="1.0" encoding="utf-8"?>
+<p:tagLst xmlns:a="http://schemas.openxmlformats.org/drawingml/2006/main" xmlns:r="http://schemas.openxmlformats.org/officeDocument/2006/relationships" xmlns:p="http://schemas.openxmlformats.org/presentationml/2006/main">
+  <p:tag name="DVSHAPEID" val="RRhioRxmNcflCpqtPXcDSM"/>
+</p:tagLst>
 </file>
 
 <file path=ppt/theme/theme1.xml><?xml version="1.0" encoding="utf-8"?>

</xml_diff>